<commit_message>
Logging added and repetitions code deleted
</commit_message>
<xml_diff>
--- a/Presentation.pptx
+++ b/Presentation.pptx
@@ -1844,7 +1844,7 @@
           </a:ln>
           <a:extLst>
             <a:ext uri="{C572A759-6A51-4108-AA02-DFA0A04FC94B}">
-              <ma14:wrappingTextBoxFlag xmlns:ma14="http://schemas.microsoft.com/office/mac/drawingml/2011/main" xmlns:a14="http://schemas.microsoft.com/office/drawing/2010/main" xmlns:m="http://schemas.openxmlformats.org/officeDocument/2006/math" xmlns="" val="1"/>
+              <ma14:wrappingTextBoxFlag xmlns="" xmlns:m="http://schemas.openxmlformats.org/officeDocument/2006/math" xmlns:a14="http://schemas.microsoft.com/office/drawing/2010/main" xmlns:ma14="http://schemas.microsoft.com/office/mac/drawingml/2011/main" val="1"/>
             </a:ext>
           </a:extLst>
         </p:spPr>
@@ -1883,7 +1883,7 @@
           </a:ln>
           <a:extLst>
             <a:ext uri="{C572A759-6A51-4108-AA02-DFA0A04FC94B}">
-              <ma14:wrappingTextBoxFlag xmlns:ma14="http://schemas.microsoft.com/office/mac/drawingml/2011/main" xmlns:a14="http://schemas.microsoft.com/office/drawing/2010/main" xmlns:m="http://schemas.openxmlformats.org/officeDocument/2006/math" xmlns="" val="1"/>
+              <ma14:wrappingTextBoxFlag xmlns="" xmlns:m="http://schemas.openxmlformats.org/officeDocument/2006/math" xmlns:a14="http://schemas.microsoft.com/office/drawing/2010/main" xmlns:ma14="http://schemas.microsoft.com/office/mac/drawingml/2011/main" val="1"/>
             </a:ext>
           </a:extLst>
         </p:spPr>
@@ -2899,7 +2899,7 @@
           </a:ln>
           <a:extLst>
             <a:ext uri="{C572A759-6A51-4108-AA02-DFA0A04FC94B}">
-              <ma14:wrappingTextBoxFlag xmlns:ma14="http://schemas.microsoft.com/office/mac/drawingml/2011/main" xmlns:a14="http://schemas.microsoft.com/office/drawing/2010/main" xmlns:m="http://schemas.openxmlformats.org/officeDocument/2006/math" xmlns="" val="1"/>
+              <ma14:wrappingTextBoxFlag xmlns="" xmlns:m="http://schemas.openxmlformats.org/officeDocument/2006/math" xmlns:a14="http://schemas.microsoft.com/office/drawing/2010/main" xmlns:ma14="http://schemas.microsoft.com/office/mac/drawingml/2011/main" val="1"/>
             </a:ext>
           </a:extLst>
         </p:spPr>
@@ -2968,7 +2968,7 @@
           </a:ln>
           <a:extLst>
             <a:ext uri="{C572A759-6A51-4108-AA02-DFA0A04FC94B}">
-              <ma14:wrappingTextBoxFlag xmlns:ma14="http://schemas.microsoft.com/office/mac/drawingml/2011/main" xmlns:a14="http://schemas.microsoft.com/office/drawing/2010/main" xmlns:m="http://schemas.openxmlformats.org/officeDocument/2006/math" xmlns="" val="1"/>
+              <ma14:wrappingTextBoxFlag xmlns="" xmlns:m="http://schemas.openxmlformats.org/officeDocument/2006/math" xmlns:a14="http://schemas.microsoft.com/office/drawing/2010/main" xmlns:ma14="http://schemas.microsoft.com/office/mac/drawingml/2011/main" val="1"/>
             </a:ext>
           </a:extLst>
         </p:spPr>
@@ -3700,7 +3700,7 @@
           </a:ln>
           <a:extLst>
             <a:ext uri="{C572A759-6A51-4108-AA02-DFA0A04FC94B}">
-              <ma14:wrappingTextBoxFlag xmlns:ma14="http://schemas.microsoft.com/office/mac/drawingml/2011/main" xmlns:a14="http://schemas.microsoft.com/office/drawing/2010/main" xmlns:m="http://schemas.openxmlformats.org/officeDocument/2006/math" xmlns="" val="1"/>
+              <ma14:wrappingTextBoxFlag xmlns="" xmlns:m="http://schemas.openxmlformats.org/officeDocument/2006/math" xmlns:a14="http://schemas.microsoft.com/office/drawing/2010/main" xmlns:ma14="http://schemas.microsoft.com/office/mac/drawingml/2011/main" val="1"/>
             </a:ext>
           </a:extLst>
         </p:spPr>
@@ -3753,7 +3753,7 @@
           </a:ln>
           <a:extLst>
             <a:ext uri="{C572A759-6A51-4108-AA02-DFA0A04FC94B}">
-              <ma14:wrappingTextBoxFlag xmlns:ma14="http://schemas.microsoft.com/office/mac/drawingml/2011/main" xmlns:a14="http://schemas.microsoft.com/office/drawing/2010/main" xmlns:m="http://schemas.openxmlformats.org/officeDocument/2006/math" xmlns="" val="1"/>
+              <ma14:wrappingTextBoxFlag xmlns="" xmlns:m="http://schemas.openxmlformats.org/officeDocument/2006/math" xmlns:a14="http://schemas.microsoft.com/office/drawing/2010/main" xmlns:ma14="http://schemas.microsoft.com/office/mac/drawingml/2011/main" val="1"/>
             </a:ext>
           </a:extLst>
         </p:spPr>
@@ -3832,7 +3832,7 @@
           </a:ln>
           <a:extLst>
             <a:ext uri="{C572A759-6A51-4108-AA02-DFA0A04FC94B}">
-              <ma14:wrappingTextBoxFlag xmlns:ma14="http://schemas.microsoft.com/office/mac/drawingml/2011/main" xmlns:a14="http://schemas.microsoft.com/office/drawing/2010/main" xmlns:m="http://schemas.openxmlformats.org/officeDocument/2006/math" xmlns="" val="1"/>
+              <ma14:wrappingTextBoxFlag xmlns="" xmlns:m="http://schemas.openxmlformats.org/officeDocument/2006/math" xmlns:a14="http://schemas.microsoft.com/office/drawing/2010/main" xmlns:ma14="http://schemas.microsoft.com/office/mac/drawingml/2011/main" val="1"/>
             </a:ext>
           </a:extLst>
         </p:spPr>
@@ -3885,7 +3885,7 @@
           </a:ln>
           <a:extLst>
             <a:ext uri="{C572A759-6A51-4108-AA02-DFA0A04FC94B}">
-              <ma14:wrappingTextBoxFlag xmlns:ma14="http://schemas.microsoft.com/office/mac/drawingml/2011/main" xmlns:a14="http://schemas.microsoft.com/office/drawing/2010/main" xmlns:m="http://schemas.openxmlformats.org/officeDocument/2006/math" xmlns="" val="1"/>
+              <ma14:wrappingTextBoxFlag xmlns="" xmlns:m="http://schemas.openxmlformats.org/officeDocument/2006/math" xmlns:a14="http://schemas.microsoft.com/office/drawing/2010/main" xmlns:ma14="http://schemas.microsoft.com/office/mac/drawingml/2011/main" val="1"/>
             </a:ext>
           </a:extLst>
         </p:spPr>
@@ -3986,7 +3986,7 @@
           </a:ln>
           <a:extLst>
             <a:ext uri="{C572A759-6A51-4108-AA02-DFA0A04FC94B}">
-              <ma14:wrappingTextBoxFlag xmlns:ma14="http://schemas.microsoft.com/office/mac/drawingml/2011/main" xmlns:a14="http://schemas.microsoft.com/office/drawing/2010/main" xmlns:m="http://schemas.openxmlformats.org/officeDocument/2006/math" xmlns="" val="1"/>
+              <ma14:wrappingTextBoxFlag xmlns="" xmlns:m="http://schemas.openxmlformats.org/officeDocument/2006/math" xmlns:a14="http://schemas.microsoft.com/office/drawing/2010/main" xmlns:ma14="http://schemas.microsoft.com/office/mac/drawingml/2011/main" val="1"/>
             </a:ext>
           </a:extLst>
         </p:spPr>
@@ -4029,7 +4029,7 @@
         <p:spPr>
           <a:xfrm>
             <a:off x="13601969" y="6326831"/>
-            <a:ext cx="8659336" cy="2283830"/>
+            <a:ext cx="8659336" cy="2318583"/>
           </a:xfrm>
           <a:prstGeom prst="rect">
             <a:avLst/>
@@ -4039,7 +4039,7 @@
           </a:ln>
           <a:extLst>
             <a:ext uri="{C572A759-6A51-4108-AA02-DFA0A04FC94B}">
-              <ma14:wrappingTextBoxFlag xmlns:ma14="http://schemas.microsoft.com/office/mac/drawingml/2011/main" xmlns:a14="http://schemas.microsoft.com/office/drawing/2010/main" xmlns:m="http://schemas.openxmlformats.org/officeDocument/2006/math" xmlns="" val="1"/>
+              <ma14:wrappingTextBoxFlag xmlns="" xmlns:m="http://schemas.openxmlformats.org/officeDocument/2006/math" xmlns:a14="http://schemas.microsoft.com/office/drawing/2010/main" xmlns:ma14="http://schemas.microsoft.com/office/mac/drawingml/2011/main" val="1"/>
             </a:ext>
           </a:extLst>
         </p:spPr>
@@ -4095,7 +4095,19 @@
               <a:rPr lang="ru-RU" sz="2400" dirty="0" smtClean="0">
                 <a:latin typeface="Montserrat" pitchFamily="2" charset="-52"/>
               </a:rPr>
-              <a:t> Долгое время обучался, как самоучка, пока не поступил на факультет компьютерных наук и курс от </a:t>
+              <a:t> Долгое время обучался, как самоучка, пока не поступил на факультет компьютерных наук и </a:t>
+            </a:r>
+            <a:r>
+              <a:rPr lang="ru-RU" sz="2400" dirty="0" smtClean="0">
+                <a:latin typeface="Montserrat" pitchFamily="2" charset="-52"/>
+              </a:rPr>
+              <a:t>на курс </a:t>
+            </a:r>
+            <a:r>
+              <a:rPr lang="ru-RU" sz="2400" dirty="0" smtClean="0">
+                <a:latin typeface="Montserrat" pitchFamily="2" charset="-52"/>
+              </a:rPr>
+              <a:t>от </a:t>
             </a:r>
             <a:r>
               <a:rPr lang="en-US" sz="2400" b="1" dirty="0" smtClean="0">
@@ -4128,7 +4140,7 @@
           </a:ln>
           <a:extLst>
             <a:ext uri="{C572A759-6A51-4108-AA02-DFA0A04FC94B}">
-              <ma14:wrappingTextBoxFlag xmlns:ma14="http://schemas.microsoft.com/office/mac/drawingml/2011/main" xmlns:a14="http://schemas.microsoft.com/office/drawing/2010/main" xmlns:m="http://schemas.openxmlformats.org/officeDocument/2006/math" xmlns="" val="1"/>
+              <ma14:wrappingTextBoxFlag xmlns="" xmlns:m="http://schemas.openxmlformats.org/officeDocument/2006/math" xmlns:a14="http://schemas.microsoft.com/office/drawing/2010/main" xmlns:ma14="http://schemas.microsoft.com/office/mac/drawingml/2011/main" val="1"/>
             </a:ext>
           </a:extLst>
         </p:spPr>
@@ -5388,7 +5400,7 @@
           <a:effectLst/>
           <a:extLst>
             <a:ext uri="{C572A759-6A51-4108-AA02-DFA0A04FC94B}">
-              <ma14:wrappingTextBoxFlag xmlns:ma14="http://schemas.microsoft.com/office/mac/drawingml/2011/main" xmlns:a14="http://schemas.microsoft.com/office/drawing/2010/main" xmlns:m="http://schemas.openxmlformats.org/officeDocument/2006/math" xmlns="" val="1"/>
+              <ma14:wrappingTextBoxFlag xmlns="" xmlns:m="http://schemas.openxmlformats.org/officeDocument/2006/math" xmlns:a14="http://schemas.microsoft.com/office/drawing/2010/main" xmlns:ma14="http://schemas.microsoft.com/office/mac/drawingml/2011/main" val="1"/>
             </a:ext>
           </a:extLst>
         </p:spPr>
@@ -7639,7 +7651,7 @@
           </a:ln>
           <a:extLst>
             <a:ext uri="{C572A759-6A51-4108-AA02-DFA0A04FC94B}">
-              <ma14:wrappingTextBoxFlag xmlns:ma14="http://schemas.microsoft.com/office/mac/drawingml/2011/main" xmlns:a14="http://schemas.microsoft.com/office/drawing/2010/main" xmlns:m="http://schemas.openxmlformats.org/officeDocument/2006/math" xmlns="" val="1"/>
+              <ma14:wrappingTextBoxFlag xmlns="" xmlns:m="http://schemas.openxmlformats.org/officeDocument/2006/math" xmlns:a14="http://schemas.microsoft.com/office/drawing/2010/main" xmlns:ma14="http://schemas.microsoft.com/office/mac/drawingml/2011/main" val="1"/>
             </a:ext>
           </a:extLst>
         </p:spPr>
@@ -7689,7 +7701,7 @@
           </a:ln>
           <a:extLst>
             <a:ext uri="{C572A759-6A51-4108-AA02-DFA0A04FC94B}">
-              <ma14:wrappingTextBoxFlag xmlns:ma14="http://schemas.microsoft.com/office/mac/drawingml/2011/main" xmlns:a14="http://schemas.microsoft.com/office/drawing/2010/main" xmlns:m="http://schemas.openxmlformats.org/officeDocument/2006/math" xmlns="" val="1"/>
+              <ma14:wrappingTextBoxFlag xmlns="" xmlns:m="http://schemas.openxmlformats.org/officeDocument/2006/math" xmlns:a14="http://schemas.microsoft.com/office/drawing/2010/main" xmlns:ma14="http://schemas.microsoft.com/office/mac/drawingml/2011/main" val="1"/>
             </a:ext>
           </a:extLst>
         </p:spPr>
@@ -7859,7 +7871,7 @@
           </a:ln>
           <a:extLst>
             <a:ext uri="{C572A759-6A51-4108-AA02-DFA0A04FC94B}">
-              <ma14:wrappingTextBoxFlag xmlns:ma14="http://schemas.microsoft.com/office/mac/drawingml/2011/main" xmlns:a14="http://schemas.microsoft.com/office/drawing/2010/main" xmlns:m="http://schemas.openxmlformats.org/officeDocument/2006/math" xmlns="" val="1"/>
+              <ma14:wrappingTextBoxFlag xmlns="" xmlns:m="http://schemas.openxmlformats.org/officeDocument/2006/math" xmlns:a14="http://schemas.microsoft.com/office/drawing/2010/main" xmlns:ma14="http://schemas.microsoft.com/office/mac/drawingml/2011/main" val="1"/>
             </a:ext>
           </a:extLst>
         </p:spPr>
@@ -7918,7 +7930,7 @@
           </a:ln>
           <a:extLst>
             <a:ext uri="{C572A759-6A51-4108-AA02-DFA0A04FC94B}">
-              <ma14:wrappingTextBoxFlag xmlns:ma14="http://schemas.microsoft.com/office/mac/drawingml/2011/main" xmlns:a14="http://schemas.microsoft.com/office/drawing/2010/main" xmlns:m="http://schemas.openxmlformats.org/officeDocument/2006/math" xmlns="" val="1"/>
+              <ma14:wrappingTextBoxFlag xmlns="" xmlns:m="http://schemas.openxmlformats.org/officeDocument/2006/math" xmlns:a14="http://schemas.microsoft.com/office/drawing/2010/main" xmlns:ma14="http://schemas.microsoft.com/office/mac/drawingml/2011/main" val="1"/>
             </a:ext>
           </a:extLst>
         </p:spPr>
@@ -8048,7 +8060,7 @@
           </a:ln>
           <a:extLst>
             <a:ext uri="{C572A759-6A51-4108-AA02-DFA0A04FC94B}">
-              <ma14:wrappingTextBoxFlag xmlns:ma14="http://schemas.microsoft.com/office/mac/drawingml/2011/main" xmlns:a14="http://schemas.microsoft.com/office/drawing/2010/main" xmlns:m="http://schemas.openxmlformats.org/officeDocument/2006/math" xmlns="" val="1"/>
+              <ma14:wrappingTextBoxFlag xmlns="" xmlns:m="http://schemas.openxmlformats.org/officeDocument/2006/math" xmlns:a14="http://schemas.microsoft.com/office/drawing/2010/main" xmlns:ma14="http://schemas.microsoft.com/office/mac/drawingml/2011/main" val="1"/>
             </a:ext>
           </a:extLst>
         </p:spPr>
@@ -8628,7 +8640,7 @@
           </a:ln>
           <a:extLst>
             <a:ext uri="{C572A759-6A51-4108-AA02-DFA0A04FC94B}">
-              <ma14:wrappingTextBoxFlag xmlns:ma14="http://schemas.microsoft.com/office/mac/drawingml/2011/main" xmlns:a14="http://schemas.microsoft.com/office/drawing/2010/main" xmlns:m="http://schemas.openxmlformats.org/officeDocument/2006/math" xmlns="" val="1"/>
+              <ma14:wrappingTextBoxFlag xmlns="" xmlns:m="http://schemas.openxmlformats.org/officeDocument/2006/math" xmlns:a14="http://schemas.microsoft.com/office/drawing/2010/main" xmlns:ma14="http://schemas.microsoft.com/office/mac/drawingml/2011/main" val="1"/>
             </a:ext>
           </a:extLst>
         </p:spPr>
@@ -8687,7 +8699,7 @@
           </a:ln>
           <a:extLst>
             <a:ext uri="{C572A759-6A51-4108-AA02-DFA0A04FC94B}">
-              <ma14:wrappingTextBoxFlag xmlns:ma14="http://schemas.microsoft.com/office/mac/drawingml/2011/main" xmlns:a14="http://schemas.microsoft.com/office/drawing/2010/main" xmlns:m="http://schemas.openxmlformats.org/officeDocument/2006/math" xmlns="" val="1"/>
+              <ma14:wrappingTextBoxFlag xmlns="" xmlns:m="http://schemas.openxmlformats.org/officeDocument/2006/math" xmlns:a14="http://schemas.microsoft.com/office/drawing/2010/main" xmlns:ma14="http://schemas.microsoft.com/office/mac/drawingml/2011/main" val="1"/>
             </a:ext>
           </a:extLst>
         </p:spPr>
@@ -8879,7 +8891,7 @@
                             </p:stCondLst>
                             <p:childTnLst>
                               <p:par>
-                                <p:cTn id="5" presetID="42" presetClass="entr" presetSubtype="0" fill="hold" grpId="0" nodeType="clickEffect">
+                                <p:cTn id="5" presetID="53" presetClass="entr" presetSubtype="16" fill="hold" grpId="0" nodeType="clickEffect">
                                   <p:stCondLst>
                                     <p:cond delay="0"/>
                                   </p:stCondLst>
@@ -8892,7 +8904,7 @@
                                           </p:stCondLst>
                                         </p:cTn>
                                         <p:tgtEl>
-                                          <p:spTgt spid="260"/>
+                                          <p:spTgt spid="109"/>
                                         </p:tgtEl>
                                         <p:attrNameLst>
                                           <p:attrName>style.visibility</p:attrName>
@@ -8902,96 +8914,78 @@
                                         <p:strVal val="visible"/>
                                       </p:to>
                                     </p:set>
-                                    <p:animEffect transition="in" filter="fade">
-                                      <p:cBhvr>
-                                        <p:cTn id="7" dur="1000"/>
-                                        <p:tgtEl>
-                                          <p:spTgt spid="260"/>
-                                        </p:tgtEl>
-                                      </p:cBhvr>
-                                    </p:animEffect>
                                     <p:anim calcmode="lin" valueType="num">
                                       <p:cBhvr>
-                                        <p:cTn id="8" dur="1000" fill="hold"/>
-                                        <p:tgtEl>
-                                          <p:spTgt spid="260"/>
-                                        </p:tgtEl>
-                                        <p:attrNameLst>
-                                          <p:attrName>ppt_x</p:attrName>
+                                        <p:cTn id="7" dur="500" fill="hold"/>
+                                        <p:tgtEl>
+                                          <p:spTgt spid="109"/>
+                                        </p:tgtEl>
+                                        <p:attrNameLst>
+                                          <p:attrName>ppt_w</p:attrName>
                                         </p:attrNameLst>
                                       </p:cBhvr>
                                       <p:tavLst>
                                         <p:tav tm="0">
                                           <p:val>
-                                            <p:strVal val="#ppt_x"/>
+                                            <p:fltVal val="0"/>
                                           </p:val>
                                         </p:tav>
                                         <p:tav tm="100000">
                                           <p:val>
-                                            <p:strVal val="#ppt_x"/>
+                                            <p:strVal val="#ppt_w"/>
                                           </p:val>
                                         </p:tav>
                                       </p:tavLst>
                                     </p:anim>
                                     <p:anim calcmode="lin" valueType="num">
                                       <p:cBhvr>
-                                        <p:cTn id="9" dur="1000" fill="hold"/>
-                                        <p:tgtEl>
-                                          <p:spTgt spid="260"/>
-                                        </p:tgtEl>
-                                        <p:attrNameLst>
-                                          <p:attrName>ppt_y</p:attrName>
+                                        <p:cTn id="8" dur="500" fill="hold"/>
+                                        <p:tgtEl>
+                                          <p:spTgt spid="109"/>
+                                        </p:tgtEl>
+                                        <p:attrNameLst>
+                                          <p:attrName>ppt_h</p:attrName>
                                         </p:attrNameLst>
                                       </p:cBhvr>
                                       <p:tavLst>
                                         <p:tav tm="0">
                                           <p:val>
-                                            <p:strVal val="#ppt_y+.1"/>
+                                            <p:fltVal val="0"/>
                                           </p:val>
                                         </p:tav>
                                         <p:tav tm="100000">
                                           <p:val>
-                                            <p:strVal val="#ppt_y"/>
+                                            <p:strVal val="#ppt_h"/>
                                           </p:val>
                                         </p:tav>
                                       </p:tavLst>
                                     </p:anim>
+                                    <p:animEffect transition="in" filter="fade">
+                                      <p:cBhvr>
+                                        <p:cTn id="9" dur="500"/>
+                                        <p:tgtEl>
+                                          <p:spTgt spid="109"/>
+                                        </p:tgtEl>
+                                      </p:cBhvr>
+                                    </p:animEffect>
                                   </p:childTnLst>
                                 </p:cTn>
                               </p:par>
-                            </p:childTnLst>
-                          </p:cTn>
-                        </p:par>
-                      </p:childTnLst>
-                    </p:cTn>
-                  </p:par>
-                  <p:par>
-                    <p:cTn id="10" fill="hold">
-                      <p:stCondLst>
-                        <p:cond delay="indefinite"/>
-                      </p:stCondLst>
-                      <p:childTnLst>
-                        <p:par>
-                          <p:cTn id="11" fill="hold">
-                            <p:stCondLst>
-                              <p:cond delay="0"/>
-                            </p:stCondLst>
-                            <p:childTnLst>
                               <p:par>
-                                <p:cTn id="12" presetID="53" presetClass="entr" presetSubtype="16" fill="hold" grpId="0" nodeType="clickEffect">
+                                <p:cTn id="10" presetID="53" presetClass="entr" presetSubtype="16" fill="hold" grpId="0" nodeType="withEffect">
                                   <p:stCondLst>
                                     <p:cond delay="0"/>
                                   </p:stCondLst>
                                   <p:childTnLst>
                                     <p:set>
                                       <p:cBhvr>
-                                        <p:cTn id="13" dur="1" fill="hold">
+                                        <p:cTn id="11" dur="1" fill="hold">
                                           <p:stCondLst>
                                             <p:cond delay="0"/>
                                           </p:stCondLst>
                                         </p:cTn>
                                         <p:tgtEl>
-                                          <p:spTgt spid="109"/>
+                                          <p:spTgt spid="7"/>
                                         </p:tgtEl>
                                         <p:attrNameLst>
                                           <p:attrName>style.visibility</p:attrName>
@@ -9003,9 +8997,9 @@
                                     </p:set>
                                     <p:anim calcmode="lin" valueType="num">
                                       <p:cBhvr>
-                                        <p:cTn id="14" dur="500" fill="hold"/>
-                                        <p:tgtEl>
-                                          <p:spTgt spid="109"/>
+                                        <p:cTn id="12" dur="500" fill="hold"/>
+                                        <p:tgtEl>
+                                          <p:spTgt spid="7"/>
                                         </p:tgtEl>
                                         <p:attrNameLst>
                                           <p:attrName>ppt_w</p:attrName>
@@ -9026,9 +9020,9 @@
                                     </p:anim>
                                     <p:anim calcmode="lin" valueType="num">
                                       <p:cBhvr>
-                                        <p:cTn id="15" dur="500" fill="hold"/>
-                                        <p:tgtEl>
-                                          <p:spTgt spid="109"/>
+                                        <p:cTn id="13" dur="500" fill="hold"/>
+                                        <p:tgtEl>
+                                          <p:spTgt spid="7"/>
                                         </p:tgtEl>
                                         <p:attrNameLst>
                                           <p:attrName>ppt_h</p:attrName>
@@ -9049,9 +9043,9 @@
                                     </p:anim>
                                     <p:animEffect transition="in" filter="fade">
                                       <p:cBhvr>
-                                        <p:cTn id="16" dur="500"/>
-                                        <p:tgtEl>
-                                          <p:spTgt spid="109"/>
+                                        <p:cTn id="14" dur="500"/>
+                                        <p:tgtEl>
+                                          <p:spTgt spid="7"/>
                                         </p:tgtEl>
                                       </p:cBhvr>
                                     </p:animEffect>
@@ -9059,20 +9053,20 @@
                                 </p:cTn>
                               </p:par>
                               <p:par>
-                                <p:cTn id="17" presetID="53" presetClass="entr" presetSubtype="16" fill="hold" grpId="0" nodeType="withEffect">
+                                <p:cTn id="15" presetID="53" presetClass="entr" presetSubtype="16" fill="hold" grpId="0" nodeType="withEffect">
                                   <p:stCondLst>
                                     <p:cond delay="0"/>
                                   </p:stCondLst>
                                   <p:childTnLst>
                                     <p:set>
                                       <p:cBhvr>
-                                        <p:cTn id="18" dur="1" fill="hold">
+                                        <p:cTn id="16" dur="1" fill="hold">
                                           <p:stCondLst>
                                             <p:cond delay="0"/>
                                           </p:stCondLst>
                                         </p:cTn>
                                         <p:tgtEl>
-                                          <p:spTgt spid="7"/>
+                                          <p:spTgt spid="15"/>
                                         </p:tgtEl>
                                         <p:attrNameLst>
                                           <p:attrName>style.visibility</p:attrName>
@@ -9084,9 +9078,9 @@
                                     </p:set>
                                     <p:anim calcmode="lin" valueType="num">
                                       <p:cBhvr>
-                                        <p:cTn id="19" dur="500" fill="hold"/>
-                                        <p:tgtEl>
-                                          <p:spTgt spid="7"/>
+                                        <p:cTn id="17" dur="500" fill="hold"/>
+                                        <p:tgtEl>
+                                          <p:spTgt spid="15"/>
                                         </p:tgtEl>
                                         <p:attrNameLst>
                                           <p:attrName>ppt_w</p:attrName>
@@ -9107,9 +9101,9 @@
                                     </p:anim>
                                     <p:anim calcmode="lin" valueType="num">
                                       <p:cBhvr>
-                                        <p:cTn id="20" dur="500" fill="hold"/>
-                                        <p:tgtEl>
-                                          <p:spTgt spid="7"/>
+                                        <p:cTn id="18" dur="500" fill="hold"/>
+                                        <p:tgtEl>
+                                          <p:spTgt spid="15"/>
                                         </p:tgtEl>
                                         <p:attrNameLst>
                                           <p:attrName>ppt_h</p:attrName>
@@ -9130,9 +9124,9 @@
                                     </p:anim>
                                     <p:animEffect transition="in" filter="fade">
                                       <p:cBhvr>
-                                        <p:cTn id="21" dur="500"/>
-                                        <p:tgtEl>
-                                          <p:spTgt spid="7"/>
+                                        <p:cTn id="19" dur="500"/>
+                                        <p:tgtEl>
+                                          <p:spTgt spid="15"/>
                                         </p:tgtEl>
                                       </p:cBhvr>
                                     </p:animEffect>
@@ -9140,20 +9134,20 @@
                                 </p:cTn>
                               </p:par>
                               <p:par>
-                                <p:cTn id="22" presetID="53" presetClass="entr" presetSubtype="16" fill="hold" grpId="0" nodeType="withEffect">
+                                <p:cTn id="20" presetID="53" presetClass="entr" presetSubtype="16" fill="hold" grpId="0" nodeType="withEffect">
                                   <p:stCondLst>
                                     <p:cond delay="0"/>
                                   </p:stCondLst>
                                   <p:childTnLst>
                                     <p:set>
                                       <p:cBhvr>
-                                        <p:cTn id="23" dur="1" fill="hold">
+                                        <p:cTn id="21" dur="1" fill="hold">
                                           <p:stCondLst>
                                             <p:cond delay="0"/>
                                           </p:stCondLst>
                                         </p:cTn>
                                         <p:tgtEl>
-                                          <p:spTgt spid="15"/>
+                                          <p:spTgt spid="16"/>
                                         </p:tgtEl>
                                         <p:attrNameLst>
                                           <p:attrName>style.visibility</p:attrName>
@@ -9165,9 +9159,9 @@
                                     </p:set>
                                     <p:anim calcmode="lin" valueType="num">
                                       <p:cBhvr>
-                                        <p:cTn id="24" dur="500" fill="hold"/>
-                                        <p:tgtEl>
-                                          <p:spTgt spid="15"/>
+                                        <p:cTn id="22" dur="500" fill="hold"/>
+                                        <p:tgtEl>
+                                          <p:spTgt spid="16"/>
                                         </p:tgtEl>
                                         <p:attrNameLst>
                                           <p:attrName>ppt_w</p:attrName>
@@ -9188,9 +9182,9 @@
                                     </p:anim>
                                     <p:anim calcmode="lin" valueType="num">
                                       <p:cBhvr>
-                                        <p:cTn id="25" dur="500" fill="hold"/>
-                                        <p:tgtEl>
-                                          <p:spTgt spid="15"/>
+                                        <p:cTn id="23" dur="500" fill="hold"/>
+                                        <p:tgtEl>
+                                          <p:spTgt spid="16"/>
                                         </p:tgtEl>
                                         <p:attrNameLst>
                                           <p:attrName>ppt_h</p:attrName>
@@ -9211,9 +9205,9 @@
                                     </p:anim>
                                     <p:animEffect transition="in" filter="fade">
                                       <p:cBhvr>
-                                        <p:cTn id="26" dur="500"/>
-                                        <p:tgtEl>
-                                          <p:spTgt spid="15"/>
+                                        <p:cTn id="24" dur="500"/>
+                                        <p:tgtEl>
+                                          <p:spTgt spid="16"/>
                                         </p:tgtEl>
                                       </p:cBhvr>
                                     </p:animEffect>
@@ -9221,20 +9215,20 @@
                                 </p:cTn>
                               </p:par>
                               <p:par>
-                                <p:cTn id="27" presetID="53" presetClass="entr" presetSubtype="16" fill="hold" grpId="0" nodeType="withEffect">
+                                <p:cTn id="25" presetID="53" presetClass="entr" presetSubtype="16" fill="hold" grpId="0" nodeType="withEffect">
                                   <p:stCondLst>
                                     <p:cond delay="0"/>
                                   </p:stCondLst>
                                   <p:childTnLst>
                                     <p:set>
                                       <p:cBhvr>
-                                        <p:cTn id="28" dur="1" fill="hold">
+                                        <p:cTn id="26" dur="1" fill="hold">
                                           <p:stCondLst>
                                             <p:cond delay="0"/>
                                           </p:stCondLst>
                                         </p:cTn>
                                         <p:tgtEl>
-                                          <p:spTgt spid="16"/>
+                                          <p:spTgt spid="20"/>
                                         </p:tgtEl>
                                         <p:attrNameLst>
                                           <p:attrName>style.visibility</p:attrName>
@@ -9246,9 +9240,9 @@
                                     </p:set>
                                     <p:anim calcmode="lin" valueType="num">
                                       <p:cBhvr>
-                                        <p:cTn id="29" dur="500" fill="hold"/>
-                                        <p:tgtEl>
-                                          <p:spTgt spid="16"/>
+                                        <p:cTn id="27" dur="500" fill="hold"/>
+                                        <p:tgtEl>
+                                          <p:spTgt spid="20"/>
                                         </p:tgtEl>
                                         <p:attrNameLst>
                                           <p:attrName>ppt_w</p:attrName>
@@ -9269,9 +9263,9 @@
                                     </p:anim>
                                     <p:anim calcmode="lin" valueType="num">
                                       <p:cBhvr>
-                                        <p:cTn id="30" dur="500" fill="hold"/>
-                                        <p:tgtEl>
-                                          <p:spTgt spid="16"/>
+                                        <p:cTn id="28" dur="500" fill="hold"/>
+                                        <p:tgtEl>
+                                          <p:spTgt spid="20"/>
                                         </p:tgtEl>
                                         <p:attrNameLst>
                                           <p:attrName>ppt_h</p:attrName>
@@ -9292,9 +9286,9 @@
                                     </p:anim>
                                     <p:animEffect transition="in" filter="fade">
                                       <p:cBhvr>
-                                        <p:cTn id="31" dur="500"/>
-                                        <p:tgtEl>
-                                          <p:spTgt spid="16"/>
+                                        <p:cTn id="29" dur="500"/>
+                                        <p:tgtEl>
+                                          <p:spTgt spid="20"/>
                                         </p:tgtEl>
                                       </p:cBhvr>
                                     </p:animEffect>
@@ -9302,20 +9296,20 @@
                                 </p:cTn>
                               </p:par>
                               <p:par>
-                                <p:cTn id="32" presetID="53" presetClass="entr" presetSubtype="16" fill="hold" grpId="0" nodeType="withEffect">
+                                <p:cTn id="30" presetID="53" presetClass="entr" presetSubtype="16" fill="hold" grpId="0" nodeType="withEffect">
                                   <p:stCondLst>
                                     <p:cond delay="0"/>
                                   </p:stCondLst>
                                   <p:childTnLst>
                                     <p:set>
                                       <p:cBhvr>
-                                        <p:cTn id="33" dur="1" fill="hold">
+                                        <p:cTn id="31" dur="1" fill="hold">
                                           <p:stCondLst>
                                             <p:cond delay="0"/>
                                           </p:stCondLst>
                                         </p:cTn>
                                         <p:tgtEl>
-                                          <p:spTgt spid="20"/>
+                                          <p:spTgt spid="21"/>
                                         </p:tgtEl>
                                         <p:attrNameLst>
                                           <p:attrName>style.visibility</p:attrName>
@@ -9327,9 +9321,9 @@
                                     </p:set>
                                     <p:anim calcmode="lin" valueType="num">
                                       <p:cBhvr>
-                                        <p:cTn id="34" dur="500" fill="hold"/>
-                                        <p:tgtEl>
-                                          <p:spTgt spid="20"/>
+                                        <p:cTn id="32" dur="500" fill="hold"/>
+                                        <p:tgtEl>
+                                          <p:spTgt spid="21"/>
                                         </p:tgtEl>
                                         <p:attrNameLst>
                                           <p:attrName>ppt_w</p:attrName>
@@ -9350,9 +9344,9 @@
                                     </p:anim>
                                     <p:anim calcmode="lin" valueType="num">
                                       <p:cBhvr>
-                                        <p:cTn id="35" dur="500" fill="hold"/>
-                                        <p:tgtEl>
-                                          <p:spTgt spid="20"/>
+                                        <p:cTn id="33" dur="500" fill="hold"/>
+                                        <p:tgtEl>
+                                          <p:spTgt spid="21"/>
                                         </p:tgtEl>
                                         <p:attrNameLst>
                                           <p:attrName>ppt_h</p:attrName>
@@ -9373,9 +9367,9 @@
                                     </p:anim>
                                     <p:animEffect transition="in" filter="fade">
                                       <p:cBhvr>
-                                        <p:cTn id="36" dur="500"/>
-                                        <p:tgtEl>
-                                          <p:spTgt spid="20"/>
+                                        <p:cTn id="34" dur="500"/>
+                                        <p:tgtEl>
+                                          <p:spTgt spid="21"/>
                                         </p:tgtEl>
                                       </p:cBhvr>
                                     </p:animEffect>
@@ -9383,20 +9377,20 @@
                                 </p:cTn>
                               </p:par>
                               <p:par>
-                                <p:cTn id="37" presetID="53" presetClass="entr" presetSubtype="16" fill="hold" grpId="0" nodeType="withEffect">
+                                <p:cTn id="35" presetID="53" presetClass="entr" presetSubtype="16" fill="hold" grpId="0" nodeType="withEffect">
                                   <p:stCondLst>
                                     <p:cond delay="0"/>
                                   </p:stCondLst>
                                   <p:childTnLst>
                                     <p:set>
                                       <p:cBhvr>
-                                        <p:cTn id="38" dur="1" fill="hold">
+                                        <p:cTn id="36" dur="1" fill="hold">
                                           <p:stCondLst>
                                             <p:cond delay="0"/>
                                           </p:stCondLst>
                                         </p:cTn>
                                         <p:tgtEl>
-                                          <p:spTgt spid="21"/>
+                                          <p:spTgt spid="11"/>
                                         </p:tgtEl>
                                         <p:attrNameLst>
                                           <p:attrName>style.visibility</p:attrName>
@@ -9408,9 +9402,9 @@
                                     </p:set>
                                     <p:anim calcmode="lin" valueType="num">
                                       <p:cBhvr>
-                                        <p:cTn id="39" dur="500" fill="hold"/>
-                                        <p:tgtEl>
-                                          <p:spTgt spid="21"/>
+                                        <p:cTn id="37" dur="500" fill="hold"/>
+                                        <p:tgtEl>
+                                          <p:spTgt spid="11"/>
                                         </p:tgtEl>
                                         <p:attrNameLst>
                                           <p:attrName>ppt_w</p:attrName>
@@ -9431,9 +9425,9 @@
                                     </p:anim>
                                     <p:anim calcmode="lin" valueType="num">
                                       <p:cBhvr>
-                                        <p:cTn id="40" dur="500" fill="hold"/>
-                                        <p:tgtEl>
-                                          <p:spTgt spid="21"/>
+                                        <p:cTn id="38" dur="500" fill="hold"/>
+                                        <p:tgtEl>
+                                          <p:spTgt spid="11"/>
                                         </p:tgtEl>
                                         <p:attrNameLst>
                                           <p:attrName>ppt_h</p:attrName>
@@ -9454,9 +9448,9 @@
                                     </p:anim>
                                     <p:animEffect transition="in" filter="fade">
                                       <p:cBhvr>
-                                        <p:cTn id="41" dur="500"/>
-                                        <p:tgtEl>
-                                          <p:spTgt spid="21"/>
+                                        <p:cTn id="39" dur="500"/>
+                                        <p:tgtEl>
+                                          <p:spTgt spid="11"/>
                                         </p:tgtEl>
                                       </p:cBhvr>
                                     </p:animEffect>
@@ -9464,20 +9458,20 @@
                                 </p:cTn>
                               </p:par>
                               <p:par>
-                                <p:cTn id="42" presetID="53" presetClass="entr" presetSubtype="16" fill="hold" grpId="0" nodeType="withEffect">
+                                <p:cTn id="40" presetID="53" presetClass="entr" presetSubtype="16" fill="hold" grpId="0" nodeType="withEffect">
                                   <p:stCondLst>
                                     <p:cond delay="0"/>
                                   </p:stCondLst>
                                   <p:childTnLst>
                                     <p:set>
                                       <p:cBhvr>
-                                        <p:cTn id="43" dur="1" fill="hold">
+                                        <p:cTn id="41" dur="1" fill="hold">
                                           <p:stCondLst>
                                             <p:cond delay="0"/>
                                           </p:stCondLst>
                                         </p:cTn>
                                         <p:tgtEl>
-                                          <p:spTgt spid="11"/>
+                                          <p:spTgt spid="23"/>
                                         </p:tgtEl>
                                         <p:attrNameLst>
                                           <p:attrName>style.visibility</p:attrName>
@@ -9489,9 +9483,9 @@
                                     </p:set>
                                     <p:anim calcmode="lin" valueType="num">
                                       <p:cBhvr>
-                                        <p:cTn id="44" dur="500" fill="hold"/>
-                                        <p:tgtEl>
-                                          <p:spTgt spid="11"/>
+                                        <p:cTn id="42" dur="500" fill="hold"/>
+                                        <p:tgtEl>
+                                          <p:spTgt spid="23"/>
                                         </p:tgtEl>
                                         <p:attrNameLst>
                                           <p:attrName>ppt_w</p:attrName>
@@ -9512,9 +9506,9 @@
                                     </p:anim>
                                     <p:anim calcmode="lin" valueType="num">
                                       <p:cBhvr>
-                                        <p:cTn id="45" dur="500" fill="hold"/>
-                                        <p:tgtEl>
-                                          <p:spTgt spid="11"/>
+                                        <p:cTn id="43" dur="500" fill="hold"/>
+                                        <p:tgtEl>
+                                          <p:spTgt spid="23"/>
                                         </p:tgtEl>
                                         <p:attrNameLst>
                                           <p:attrName>ppt_h</p:attrName>
@@ -9535,9 +9529,9 @@
                                     </p:anim>
                                     <p:animEffect transition="in" filter="fade">
                                       <p:cBhvr>
-                                        <p:cTn id="46" dur="500"/>
-                                        <p:tgtEl>
-                                          <p:spTgt spid="11"/>
+                                        <p:cTn id="44" dur="500"/>
+                                        <p:tgtEl>
+                                          <p:spTgt spid="23"/>
                                         </p:tgtEl>
                                       </p:cBhvr>
                                     </p:animEffect>
@@ -9545,20 +9539,20 @@
                                 </p:cTn>
                               </p:par>
                               <p:par>
-                                <p:cTn id="47" presetID="53" presetClass="entr" presetSubtype="16" fill="hold" grpId="0" nodeType="withEffect">
+                                <p:cTn id="45" presetID="53" presetClass="entr" presetSubtype="16" fill="hold" grpId="0" nodeType="withEffect">
                                   <p:stCondLst>
                                     <p:cond delay="0"/>
                                   </p:stCondLst>
                                   <p:childTnLst>
                                     <p:set>
                                       <p:cBhvr>
-                                        <p:cTn id="48" dur="1" fill="hold">
+                                        <p:cTn id="46" dur="1" fill="hold">
                                           <p:stCondLst>
                                             <p:cond delay="0"/>
                                           </p:stCondLst>
                                         </p:cTn>
                                         <p:tgtEl>
-                                          <p:spTgt spid="23"/>
+                                          <p:spTgt spid="24"/>
                                         </p:tgtEl>
                                         <p:attrNameLst>
                                           <p:attrName>style.visibility</p:attrName>
@@ -9570,9 +9564,9 @@
                                     </p:set>
                                     <p:anim calcmode="lin" valueType="num">
                                       <p:cBhvr>
-                                        <p:cTn id="49" dur="500" fill="hold"/>
-                                        <p:tgtEl>
-                                          <p:spTgt spid="23"/>
+                                        <p:cTn id="47" dur="500" fill="hold"/>
+                                        <p:tgtEl>
+                                          <p:spTgt spid="24"/>
                                         </p:tgtEl>
                                         <p:attrNameLst>
                                           <p:attrName>ppt_w</p:attrName>
@@ -9593,9 +9587,9 @@
                                     </p:anim>
                                     <p:anim calcmode="lin" valueType="num">
                                       <p:cBhvr>
-                                        <p:cTn id="50" dur="500" fill="hold"/>
-                                        <p:tgtEl>
-                                          <p:spTgt spid="23"/>
+                                        <p:cTn id="48" dur="500" fill="hold"/>
+                                        <p:tgtEl>
+                                          <p:spTgt spid="24"/>
                                         </p:tgtEl>
                                         <p:attrNameLst>
                                           <p:attrName>ppt_h</p:attrName>
@@ -9616,9 +9610,9 @@
                                     </p:anim>
                                     <p:animEffect transition="in" filter="fade">
                                       <p:cBhvr>
-                                        <p:cTn id="51" dur="500"/>
-                                        <p:tgtEl>
-                                          <p:spTgt spid="23"/>
+                                        <p:cTn id="49" dur="500"/>
+                                        <p:tgtEl>
+                                          <p:spTgt spid="24"/>
                                         </p:tgtEl>
                                       </p:cBhvr>
                                     </p:animEffect>
@@ -9626,20 +9620,20 @@
                                 </p:cTn>
                               </p:par>
                               <p:par>
-                                <p:cTn id="52" presetID="53" presetClass="entr" presetSubtype="16" fill="hold" grpId="0" nodeType="withEffect">
+                                <p:cTn id="50" presetID="53" presetClass="entr" presetSubtype="16" fill="hold" grpId="0" nodeType="withEffect">
                                   <p:stCondLst>
                                     <p:cond delay="0"/>
                                   </p:stCondLst>
                                   <p:childTnLst>
                                     <p:set>
                                       <p:cBhvr>
-                                        <p:cTn id="53" dur="1" fill="hold">
+                                        <p:cTn id="51" dur="1" fill="hold">
                                           <p:stCondLst>
                                             <p:cond delay="0"/>
                                           </p:stCondLst>
                                         </p:cTn>
                                         <p:tgtEl>
-                                          <p:spTgt spid="24"/>
+                                          <p:spTgt spid="25"/>
                                         </p:tgtEl>
                                         <p:attrNameLst>
                                           <p:attrName>style.visibility</p:attrName>
@@ -9651,9 +9645,9 @@
                                     </p:set>
                                     <p:anim calcmode="lin" valueType="num">
                                       <p:cBhvr>
-                                        <p:cTn id="54" dur="500" fill="hold"/>
-                                        <p:tgtEl>
-                                          <p:spTgt spid="24"/>
+                                        <p:cTn id="52" dur="500" fill="hold"/>
+                                        <p:tgtEl>
+                                          <p:spTgt spid="25"/>
                                         </p:tgtEl>
                                         <p:attrNameLst>
                                           <p:attrName>ppt_w</p:attrName>
@@ -9674,9 +9668,9 @@
                                     </p:anim>
                                     <p:anim calcmode="lin" valueType="num">
                                       <p:cBhvr>
-                                        <p:cTn id="55" dur="500" fill="hold"/>
-                                        <p:tgtEl>
-                                          <p:spTgt spid="24"/>
+                                        <p:cTn id="53" dur="500" fill="hold"/>
+                                        <p:tgtEl>
+                                          <p:spTgt spid="25"/>
                                         </p:tgtEl>
                                         <p:attrNameLst>
                                           <p:attrName>ppt_h</p:attrName>
@@ -9697,9 +9691,9 @@
                                     </p:anim>
                                     <p:animEffect transition="in" filter="fade">
                                       <p:cBhvr>
-                                        <p:cTn id="56" dur="500"/>
-                                        <p:tgtEl>
-                                          <p:spTgt spid="24"/>
+                                        <p:cTn id="54" dur="500"/>
+                                        <p:tgtEl>
+                                          <p:spTgt spid="25"/>
                                         </p:tgtEl>
                                       </p:cBhvr>
                                     </p:animEffect>
@@ -9707,20 +9701,20 @@
                                 </p:cTn>
                               </p:par>
                               <p:par>
-                                <p:cTn id="57" presetID="53" presetClass="entr" presetSubtype="16" fill="hold" grpId="0" nodeType="withEffect">
+                                <p:cTn id="55" presetID="53" presetClass="entr" presetSubtype="16" fill="hold" grpId="0" nodeType="withEffect">
                                   <p:stCondLst>
                                     <p:cond delay="0"/>
                                   </p:stCondLst>
                                   <p:childTnLst>
                                     <p:set>
                                       <p:cBhvr>
-                                        <p:cTn id="58" dur="1" fill="hold">
+                                        <p:cTn id="56" dur="1" fill="hold">
                                           <p:stCondLst>
                                             <p:cond delay="0"/>
                                           </p:stCondLst>
                                         </p:cTn>
                                         <p:tgtEl>
-                                          <p:spTgt spid="25"/>
+                                          <p:spTgt spid="26"/>
                                         </p:tgtEl>
                                         <p:attrNameLst>
                                           <p:attrName>style.visibility</p:attrName>
@@ -9732,9 +9726,9 @@
                                     </p:set>
                                     <p:anim calcmode="lin" valueType="num">
                                       <p:cBhvr>
-                                        <p:cTn id="59" dur="500" fill="hold"/>
-                                        <p:tgtEl>
-                                          <p:spTgt spid="25"/>
+                                        <p:cTn id="57" dur="500" fill="hold"/>
+                                        <p:tgtEl>
+                                          <p:spTgt spid="26"/>
                                         </p:tgtEl>
                                         <p:attrNameLst>
                                           <p:attrName>ppt_w</p:attrName>
@@ -9755,9 +9749,9 @@
                                     </p:anim>
                                     <p:anim calcmode="lin" valueType="num">
                                       <p:cBhvr>
-                                        <p:cTn id="60" dur="500" fill="hold"/>
-                                        <p:tgtEl>
-                                          <p:spTgt spid="25"/>
+                                        <p:cTn id="58" dur="500" fill="hold"/>
+                                        <p:tgtEl>
+                                          <p:spTgt spid="26"/>
                                         </p:tgtEl>
                                         <p:attrNameLst>
                                           <p:attrName>ppt_h</p:attrName>
@@ -9778,9 +9772,9 @@
                                     </p:anim>
                                     <p:animEffect transition="in" filter="fade">
                                       <p:cBhvr>
-                                        <p:cTn id="61" dur="500"/>
-                                        <p:tgtEl>
-                                          <p:spTgt spid="25"/>
+                                        <p:cTn id="59" dur="500"/>
+                                        <p:tgtEl>
+                                          <p:spTgt spid="26"/>
                                         </p:tgtEl>
                                       </p:cBhvr>
                                     </p:animEffect>
@@ -9788,20 +9782,20 @@
                                 </p:cTn>
                               </p:par>
                               <p:par>
-                                <p:cTn id="62" presetID="53" presetClass="entr" presetSubtype="16" fill="hold" grpId="0" nodeType="withEffect">
+                                <p:cTn id="60" presetID="53" presetClass="entr" presetSubtype="16" fill="hold" grpId="0" nodeType="withEffect">
                                   <p:stCondLst>
                                     <p:cond delay="0"/>
                                   </p:stCondLst>
                                   <p:childTnLst>
                                     <p:set>
                                       <p:cBhvr>
-                                        <p:cTn id="63" dur="1" fill="hold">
+                                        <p:cTn id="61" dur="1" fill="hold">
                                           <p:stCondLst>
                                             <p:cond delay="0"/>
                                           </p:stCondLst>
                                         </p:cTn>
                                         <p:tgtEl>
-                                          <p:spTgt spid="26"/>
+                                          <p:spTgt spid="27"/>
                                         </p:tgtEl>
                                         <p:attrNameLst>
                                           <p:attrName>style.visibility</p:attrName>
@@ -9813,9 +9807,9 @@
                                     </p:set>
                                     <p:anim calcmode="lin" valueType="num">
                                       <p:cBhvr>
-                                        <p:cTn id="64" dur="500" fill="hold"/>
-                                        <p:tgtEl>
-                                          <p:spTgt spid="26"/>
+                                        <p:cTn id="62" dur="500" fill="hold"/>
+                                        <p:tgtEl>
+                                          <p:spTgt spid="27"/>
                                         </p:tgtEl>
                                         <p:attrNameLst>
                                           <p:attrName>ppt_w</p:attrName>
@@ -9836,9 +9830,9 @@
                                     </p:anim>
                                     <p:anim calcmode="lin" valueType="num">
                                       <p:cBhvr>
-                                        <p:cTn id="65" dur="500" fill="hold"/>
-                                        <p:tgtEl>
-                                          <p:spTgt spid="26"/>
+                                        <p:cTn id="63" dur="500" fill="hold"/>
+                                        <p:tgtEl>
+                                          <p:spTgt spid="27"/>
                                         </p:tgtEl>
                                         <p:attrNameLst>
                                           <p:attrName>ppt_h</p:attrName>
@@ -9859,9 +9853,9 @@
                                     </p:anim>
                                     <p:animEffect transition="in" filter="fade">
                                       <p:cBhvr>
-                                        <p:cTn id="66" dur="500"/>
-                                        <p:tgtEl>
-                                          <p:spTgt spid="26"/>
+                                        <p:cTn id="64" dur="500"/>
+                                        <p:tgtEl>
+                                          <p:spTgt spid="27"/>
                                         </p:tgtEl>
                                       </p:cBhvr>
                                     </p:animEffect>
@@ -9869,20 +9863,20 @@
                                 </p:cTn>
                               </p:par>
                               <p:par>
-                                <p:cTn id="67" presetID="53" presetClass="entr" presetSubtype="16" fill="hold" grpId="0" nodeType="withEffect">
+                                <p:cTn id="65" presetID="53" presetClass="entr" presetSubtype="16" fill="hold" grpId="0" nodeType="withEffect">
                                   <p:stCondLst>
                                     <p:cond delay="0"/>
                                   </p:stCondLst>
                                   <p:childTnLst>
                                     <p:set>
                                       <p:cBhvr>
-                                        <p:cTn id="68" dur="1" fill="hold">
+                                        <p:cTn id="66" dur="1" fill="hold">
                                           <p:stCondLst>
                                             <p:cond delay="0"/>
                                           </p:stCondLst>
                                         </p:cTn>
                                         <p:tgtEl>
-                                          <p:spTgt spid="27"/>
+                                          <p:spTgt spid="30"/>
                                         </p:tgtEl>
                                         <p:attrNameLst>
                                           <p:attrName>style.visibility</p:attrName>
@@ -9894,9 +9888,9 @@
                                     </p:set>
                                     <p:anim calcmode="lin" valueType="num">
                                       <p:cBhvr>
-                                        <p:cTn id="69" dur="500" fill="hold"/>
-                                        <p:tgtEl>
-                                          <p:spTgt spid="27"/>
+                                        <p:cTn id="67" dur="500" fill="hold"/>
+                                        <p:tgtEl>
+                                          <p:spTgt spid="30"/>
                                         </p:tgtEl>
                                         <p:attrNameLst>
                                           <p:attrName>ppt_w</p:attrName>
@@ -9917,9 +9911,9 @@
                                     </p:anim>
                                     <p:anim calcmode="lin" valueType="num">
                                       <p:cBhvr>
-                                        <p:cTn id="70" dur="500" fill="hold"/>
-                                        <p:tgtEl>
-                                          <p:spTgt spid="27"/>
+                                        <p:cTn id="68" dur="500" fill="hold"/>
+                                        <p:tgtEl>
+                                          <p:spTgt spid="30"/>
                                         </p:tgtEl>
                                         <p:attrNameLst>
                                           <p:attrName>ppt_h</p:attrName>
@@ -9940,9 +9934,9 @@
                                     </p:anim>
                                     <p:animEffect transition="in" filter="fade">
                                       <p:cBhvr>
-                                        <p:cTn id="71" dur="500"/>
-                                        <p:tgtEl>
-                                          <p:spTgt spid="27"/>
+                                        <p:cTn id="69" dur="500"/>
+                                        <p:tgtEl>
+                                          <p:spTgt spid="30"/>
                                         </p:tgtEl>
                                       </p:cBhvr>
                                     </p:animEffect>
@@ -9950,20 +9944,20 @@
                                 </p:cTn>
                               </p:par>
                               <p:par>
-                                <p:cTn id="72" presetID="53" presetClass="entr" presetSubtype="16" fill="hold" grpId="0" nodeType="withEffect">
+                                <p:cTn id="70" presetID="53" presetClass="entr" presetSubtype="16" fill="hold" nodeType="withEffect">
                                   <p:stCondLst>
                                     <p:cond delay="0"/>
                                   </p:stCondLst>
                                   <p:childTnLst>
                                     <p:set>
                                       <p:cBhvr>
-                                        <p:cTn id="73" dur="1" fill="hold">
+                                        <p:cTn id="71" dur="1" fill="hold">
                                           <p:stCondLst>
                                             <p:cond delay="0"/>
                                           </p:stCondLst>
                                         </p:cTn>
                                         <p:tgtEl>
-                                          <p:spTgt spid="30"/>
+                                          <p:spTgt spid="33"/>
                                         </p:tgtEl>
                                         <p:attrNameLst>
                                           <p:attrName>style.visibility</p:attrName>
@@ -9975,9 +9969,9 @@
                                     </p:set>
                                     <p:anim calcmode="lin" valueType="num">
                                       <p:cBhvr>
-                                        <p:cTn id="74" dur="500" fill="hold"/>
-                                        <p:tgtEl>
-                                          <p:spTgt spid="30"/>
+                                        <p:cTn id="72" dur="500" fill="hold"/>
+                                        <p:tgtEl>
+                                          <p:spTgt spid="33"/>
                                         </p:tgtEl>
                                         <p:attrNameLst>
                                           <p:attrName>ppt_w</p:attrName>
@@ -9998,9 +9992,9 @@
                                     </p:anim>
                                     <p:anim calcmode="lin" valueType="num">
                                       <p:cBhvr>
-                                        <p:cTn id="75" dur="500" fill="hold"/>
-                                        <p:tgtEl>
-                                          <p:spTgt spid="30"/>
+                                        <p:cTn id="73" dur="500" fill="hold"/>
+                                        <p:tgtEl>
+                                          <p:spTgt spid="33"/>
                                         </p:tgtEl>
                                         <p:attrNameLst>
                                           <p:attrName>ppt_h</p:attrName>
@@ -10021,9 +10015,9 @@
                                     </p:anim>
                                     <p:animEffect transition="in" filter="fade">
                                       <p:cBhvr>
-                                        <p:cTn id="76" dur="500"/>
-                                        <p:tgtEl>
-                                          <p:spTgt spid="30"/>
+                                        <p:cTn id="74" dur="500"/>
+                                        <p:tgtEl>
+                                          <p:spTgt spid="33"/>
                                         </p:tgtEl>
                                       </p:cBhvr>
                                     </p:animEffect>
@@ -10031,20 +10025,20 @@
                                 </p:cTn>
                               </p:par>
                               <p:par>
-                                <p:cTn id="77" presetID="53" presetClass="entr" presetSubtype="16" fill="hold" nodeType="withEffect">
+                                <p:cTn id="75" presetID="53" presetClass="entr" presetSubtype="16" fill="hold" nodeType="withEffect">
                                   <p:stCondLst>
                                     <p:cond delay="0"/>
                                   </p:stCondLst>
                                   <p:childTnLst>
                                     <p:set>
                                       <p:cBhvr>
-                                        <p:cTn id="78" dur="1" fill="hold">
+                                        <p:cTn id="76" dur="1" fill="hold">
                                           <p:stCondLst>
                                             <p:cond delay="0"/>
                                           </p:stCondLst>
                                         </p:cTn>
                                         <p:tgtEl>
-                                          <p:spTgt spid="33"/>
+                                          <p:spTgt spid="28"/>
                                         </p:tgtEl>
                                         <p:attrNameLst>
                                           <p:attrName>style.visibility</p:attrName>
@@ -10056,9 +10050,9 @@
                                     </p:set>
                                     <p:anim calcmode="lin" valueType="num">
                                       <p:cBhvr>
-                                        <p:cTn id="79" dur="500" fill="hold"/>
-                                        <p:tgtEl>
-                                          <p:spTgt spid="33"/>
+                                        <p:cTn id="77" dur="500" fill="hold"/>
+                                        <p:tgtEl>
+                                          <p:spTgt spid="28"/>
                                         </p:tgtEl>
                                         <p:attrNameLst>
                                           <p:attrName>ppt_w</p:attrName>
@@ -10079,9 +10073,9 @@
                                     </p:anim>
                                     <p:anim calcmode="lin" valueType="num">
                                       <p:cBhvr>
-                                        <p:cTn id="80" dur="500" fill="hold"/>
-                                        <p:tgtEl>
-                                          <p:spTgt spid="33"/>
+                                        <p:cTn id="78" dur="500" fill="hold"/>
+                                        <p:tgtEl>
+                                          <p:spTgt spid="28"/>
                                         </p:tgtEl>
                                         <p:attrNameLst>
                                           <p:attrName>ppt_h</p:attrName>
@@ -10102,9 +10096,9 @@
                                     </p:anim>
                                     <p:animEffect transition="in" filter="fade">
                                       <p:cBhvr>
-                                        <p:cTn id="81" dur="500"/>
-                                        <p:tgtEl>
-                                          <p:spTgt spid="33"/>
+                                        <p:cTn id="79" dur="500"/>
+                                        <p:tgtEl>
+                                          <p:spTgt spid="28"/>
                                         </p:tgtEl>
                                       </p:cBhvr>
                                     </p:animEffect>
@@ -10112,20 +10106,20 @@
                                 </p:cTn>
                               </p:par>
                               <p:par>
-                                <p:cTn id="82" presetID="53" presetClass="entr" presetSubtype="16" fill="hold" nodeType="withEffect">
+                                <p:cTn id="80" presetID="53" presetClass="entr" presetSubtype="16" fill="hold" nodeType="withEffect">
                                   <p:stCondLst>
                                     <p:cond delay="0"/>
                                   </p:stCondLst>
                                   <p:childTnLst>
                                     <p:set>
                                       <p:cBhvr>
-                                        <p:cTn id="83" dur="1" fill="hold">
+                                        <p:cTn id="81" dur="1" fill="hold">
                                           <p:stCondLst>
                                             <p:cond delay="0"/>
                                           </p:stCondLst>
                                         </p:cTn>
                                         <p:tgtEl>
-                                          <p:spTgt spid="28"/>
+                                          <p:spTgt spid="29"/>
                                         </p:tgtEl>
                                         <p:attrNameLst>
                                           <p:attrName>style.visibility</p:attrName>
@@ -10137,9 +10131,9 @@
                                     </p:set>
                                     <p:anim calcmode="lin" valueType="num">
                                       <p:cBhvr>
-                                        <p:cTn id="84" dur="500" fill="hold"/>
-                                        <p:tgtEl>
-                                          <p:spTgt spid="28"/>
+                                        <p:cTn id="82" dur="500" fill="hold"/>
+                                        <p:tgtEl>
+                                          <p:spTgt spid="29"/>
                                         </p:tgtEl>
                                         <p:attrNameLst>
                                           <p:attrName>ppt_w</p:attrName>
@@ -10160,9 +10154,9 @@
                                     </p:anim>
                                     <p:anim calcmode="lin" valueType="num">
                                       <p:cBhvr>
-                                        <p:cTn id="85" dur="500" fill="hold"/>
-                                        <p:tgtEl>
-                                          <p:spTgt spid="28"/>
+                                        <p:cTn id="83" dur="500" fill="hold"/>
+                                        <p:tgtEl>
+                                          <p:spTgt spid="29"/>
                                         </p:tgtEl>
                                         <p:attrNameLst>
                                           <p:attrName>ppt_h</p:attrName>
@@ -10183,9 +10177,9 @@
                                     </p:anim>
                                     <p:animEffect transition="in" filter="fade">
                                       <p:cBhvr>
-                                        <p:cTn id="86" dur="500"/>
-                                        <p:tgtEl>
-                                          <p:spTgt spid="28"/>
+                                        <p:cTn id="84" dur="500"/>
+                                        <p:tgtEl>
+                                          <p:spTgt spid="29"/>
                                         </p:tgtEl>
                                       </p:cBhvr>
                                     </p:animEffect>
@@ -10193,20 +10187,20 @@
                                 </p:cTn>
                               </p:par>
                               <p:par>
-                                <p:cTn id="87" presetID="53" presetClass="entr" presetSubtype="16" fill="hold" nodeType="withEffect">
+                                <p:cTn id="85" presetID="53" presetClass="entr" presetSubtype="16" fill="hold" nodeType="withEffect">
                                   <p:stCondLst>
                                     <p:cond delay="0"/>
                                   </p:stCondLst>
                                   <p:childTnLst>
                                     <p:set>
                                       <p:cBhvr>
-                                        <p:cTn id="88" dur="1" fill="hold">
+                                        <p:cTn id="86" dur="1" fill="hold">
                                           <p:stCondLst>
                                             <p:cond delay="0"/>
                                           </p:stCondLst>
                                         </p:cTn>
                                         <p:tgtEl>
-                                          <p:spTgt spid="29"/>
+                                          <p:spTgt spid="36"/>
                                         </p:tgtEl>
                                         <p:attrNameLst>
                                           <p:attrName>style.visibility</p:attrName>
@@ -10218,9 +10212,9 @@
                                     </p:set>
                                     <p:anim calcmode="lin" valueType="num">
                                       <p:cBhvr>
-                                        <p:cTn id="89" dur="500" fill="hold"/>
-                                        <p:tgtEl>
-                                          <p:spTgt spid="29"/>
+                                        <p:cTn id="87" dur="500" fill="hold"/>
+                                        <p:tgtEl>
+                                          <p:spTgt spid="36"/>
                                         </p:tgtEl>
                                         <p:attrNameLst>
                                           <p:attrName>ppt_w</p:attrName>
@@ -10241,9 +10235,9 @@
                                     </p:anim>
                                     <p:anim calcmode="lin" valueType="num">
                                       <p:cBhvr>
-                                        <p:cTn id="90" dur="500" fill="hold"/>
-                                        <p:tgtEl>
-                                          <p:spTgt spid="29"/>
+                                        <p:cTn id="88" dur="500" fill="hold"/>
+                                        <p:tgtEl>
+                                          <p:spTgt spid="36"/>
                                         </p:tgtEl>
                                         <p:attrNameLst>
                                           <p:attrName>ppt_h</p:attrName>
@@ -10264,9 +10258,9 @@
                                     </p:anim>
                                     <p:animEffect transition="in" filter="fade">
                                       <p:cBhvr>
-                                        <p:cTn id="91" dur="500"/>
-                                        <p:tgtEl>
-                                          <p:spTgt spid="29"/>
+                                        <p:cTn id="89" dur="500"/>
+                                        <p:tgtEl>
+                                          <p:spTgt spid="36"/>
                                         </p:tgtEl>
                                       </p:cBhvr>
                                     </p:animEffect>
@@ -10274,20 +10268,20 @@
                                 </p:cTn>
                               </p:par>
                               <p:par>
-                                <p:cTn id="92" presetID="53" presetClass="entr" presetSubtype="16" fill="hold" nodeType="withEffect">
+                                <p:cTn id="90" presetID="53" presetClass="entr" presetSubtype="16" fill="hold" grpId="0" nodeType="withEffect">
                                   <p:stCondLst>
                                     <p:cond delay="0"/>
                                   </p:stCondLst>
                                   <p:childTnLst>
                                     <p:set>
                                       <p:cBhvr>
-                                        <p:cTn id="93" dur="1" fill="hold">
+                                        <p:cTn id="91" dur="1" fill="hold">
                                           <p:stCondLst>
                                             <p:cond delay="0"/>
                                           </p:stCondLst>
                                         </p:cTn>
                                         <p:tgtEl>
-                                          <p:spTgt spid="36"/>
+                                          <p:spTgt spid="22"/>
                                         </p:tgtEl>
                                         <p:attrNameLst>
                                           <p:attrName>style.visibility</p:attrName>
@@ -10299,9 +10293,9 @@
                                     </p:set>
                                     <p:anim calcmode="lin" valueType="num">
                                       <p:cBhvr>
-                                        <p:cTn id="94" dur="500" fill="hold"/>
-                                        <p:tgtEl>
-                                          <p:spTgt spid="36"/>
+                                        <p:cTn id="92" dur="500" fill="hold"/>
+                                        <p:tgtEl>
+                                          <p:spTgt spid="22"/>
                                         </p:tgtEl>
                                         <p:attrNameLst>
                                           <p:attrName>ppt_w</p:attrName>
@@ -10322,9 +10316,9 @@
                                     </p:anim>
                                     <p:anim calcmode="lin" valueType="num">
                                       <p:cBhvr>
-                                        <p:cTn id="95" dur="500" fill="hold"/>
-                                        <p:tgtEl>
-                                          <p:spTgt spid="36"/>
+                                        <p:cTn id="93" dur="500" fill="hold"/>
+                                        <p:tgtEl>
+                                          <p:spTgt spid="22"/>
                                         </p:tgtEl>
                                         <p:attrNameLst>
                                           <p:attrName>ppt_h</p:attrName>
@@ -10345,9 +10339,9 @@
                                     </p:anim>
                                     <p:animEffect transition="in" filter="fade">
                                       <p:cBhvr>
-                                        <p:cTn id="96" dur="500"/>
-                                        <p:tgtEl>
-                                          <p:spTgt spid="36"/>
+                                        <p:cTn id="94" dur="500"/>
+                                        <p:tgtEl>
+                                          <p:spTgt spid="22"/>
                                         </p:tgtEl>
                                       </p:cBhvr>
                                     </p:animEffect>
@@ -10355,20 +10349,20 @@
                                 </p:cTn>
                               </p:par>
                               <p:par>
-                                <p:cTn id="97" presetID="53" presetClass="entr" presetSubtype="16" fill="hold" grpId="0" nodeType="withEffect">
+                                <p:cTn id="95" presetID="53" presetClass="entr" presetSubtype="16" fill="hold" grpId="0" nodeType="withEffect">
                                   <p:stCondLst>
                                     <p:cond delay="0"/>
                                   </p:stCondLst>
                                   <p:childTnLst>
                                     <p:set>
                                       <p:cBhvr>
-                                        <p:cTn id="98" dur="1" fill="hold">
+                                        <p:cTn id="96" dur="1" fill="hold">
                                           <p:stCondLst>
                                             <p:cond delay="0"/>
                                           </p:stCondLst>
                                         </p:cTn>
                                         <p:tgtEl>
-                                          <p:spTgt spid="22"/>
+                                          <p:spTgt spid="41"/>
                                         </p:tgtEl>
                                         <p:attrNameLst>
                                           <p:attrName>style.visibility</p:attrName>
@@ -10380,9 +10374,9 @@
                                     </p:set>
                                     <p:anim calcmode="lin" valueType="num">
                                       <p:cBhvr>
-                                        <p:cTn id="99" dur="500" fill="hold"/>
-                                        <p:tgtEl>
-                                          <p:spTgt spid="22"/>
+                                        <p:cTn id="97" dur="500" fill="hold"/>
+                                        <p:tgtEl>
+                                          <p:spTgt spid="41"/>
                                         </p:tgtEl>
                                         <p:attrNameLst>
                                           <p:attrName>ppt_w</p:attrName>
@@ -10403,9 +10397,9 @@
                                     </p:anim>
                                     <p:anim calcmode="lin" valueType="num">
                                       <p:cBhvr>
-                                        <p:cTn id="100" dur="500" fill="hold"/>
-                                        <p:tgtEl>
-                                          <p:spTgt spid="22"/>
+                                        <p:cTn id="98" dur="500" fill="hold"/>
+                                        <p:tgtEl>
+                                          <p:spTgt spid="41"/>
                                         </p:tgtEl>
                                         <p:attrNameLst>
                                           <p:attrName>ppt_h</p:attrName>
@@ -10426,9 +10420,9 @@
                                     </p:anim>
                                     <p:animEffect transition="in" filter="fade">
                                       <p:cBhvr>
-                                        <p:cTn id="101" dur="500"/>
-                                        <p:tgtEl>
-                                          <p:spTgt spid="22"/>
+                                        <p:cTn id="99" dur="500"/>
+                                        <p:tgtEl>
+                                          <p:spTgt spid="41"/>
                                         </p:tgtEl>
                                       </p:cBhvr>
                                     </p:animEffect>
@@ -10436,20 +10430,20 @@
                                 </p:cTn>
                               </p:par>
                               <p:par>
-                                <p:cTn id="102" presetID="53" presetClass="entr" presetSubtype="16" fill="hold" grpId="0" nodeType="withEffect">
+                                <p:cTn id="100" presetID="53" presetClass="entr" presetSubtype="16" fill="hold" grpId="0" nodeType="withEffect">
                                   <p:stCondLst>
                                     <p:cond delay="0"/>
                                   </p:stCondLst>
                                   <p:childTnLst>
                                     <p:set>
                                       <p:cBhvr>
-                                        <p:cTn id="103" dur="1" fill="hold">
+                                        <p:cTn id="101" dur="1" fill="hold">
                                           <p:stCondLst>
                                             <p:cond delay="0"/>
                                           </p:stCondLst>
                                         </p:cTn>
                                         <p:tgtEl>
-                                          <p:spTgt spid="41"/>
+                                          <p:spTgt spid="93"/>
                                         </p:tgtEl>
                                         <p:attrNameLst>
                                           <p:attrName>style.visibility</p:attrName>
@@ -10461,9 +10455,9 @@
                                     </p:set>
                                     <p:anim calcmode="lin" valueType="num">
                                       <p:cBhvr>
-                                        <p:cTn id="104" dur="500" fill="hold"/>
-                                        <p:tgtEl>
-                                          <p:spTgt spid="41"/>
+                                        <p:cTn id="102" dur="500" fill="hold"/>
+                                        <p:tgtEl>
+                                          <p:spTgt spid="93"/>
                                         </p:tgtEl>
                                         <p:attrNameLst>
                                           <p:attrName>ppt_w</p:attrName>
@@ -10484,9 +10478,9 @@
                                     </p:anim>
                                     <p:anim calcmode="lin" valueType="num">
                                       <p:cBhvr>
-                                        <p:cTn id="105" dur="500" fill="hold"/>
-                                        <p:tgtEl>
-                                          <p:spTgt spid="41"/>
+                                        <p:cTn id="103" dur="500" fill="hold"/>
+                                        <p:tgtEl>
+                                          <p:spTgt spid="93"/>
                                         </p:tgtEl>
                                         <p:attrNameLst>
                                           <p:attrName>ppt_h</p:attrName>
@@ -10507,9 +10501,9 @@
                                     </p:anim>
                                     <p:animEffect transition="in" filter="fade">
                                       <p:cBhvr>
-                                        <p:cTn id="106" dur="500"/>
-                                        <p:tgtEl>
-                                          <p:spTgt spid="41"/>
+                                        <p:cTn id="104" dur="500"/>
+                                        <p:tgtEl>
+                                          <p:spTgt spid="93"/>
                                         </p:tgtEl>
                                       </p:cBhvr>
                                     </p:animEffect>
@@ -10517,20 +10511,20 @@
                                 </p:cTn>
                               </p:par>
                               <p:par>
-                                <p:cTn id="107" presetID="53" presetClass="entr" presetSubtype="16" fill="hold" grpId="0" nodeType="withEffect">
+                                <p:cTn id="105" presetID="53" presetClass="entr" presetSubtype="16" fill="hold" grpId="0" nodeType="withEffect">
                                   <p:stCondLst>
                                     <p:cond delay="0"/>
                                   </p:stCondLst>
                                   <p:childTnLst>
                                     <p:set>
                                       <p:cBhvr>
-                                        <p:cTn id="108" dur="1" fill="hold">
+                                        <p:cTn id="106" dur="1" fill="hold">
                                           <p:stCondLst>
                                             <p:cond delay="0"/>
                                           </p:stCondLst>
                                         </p:cTn>
                                         <p:tgtEl>
-                                          <p:spTgt spid="93"/>
+                                          <p:spTgt spid="94"/>
                                         </p:tgtEl>
                                         <p:attrNameLst>
                                           <p:attrName>style.visibility</p:attrName>
@@ -10542,9 +10536,9 @@
                                     </p:set>
                                     <p:anim calcmode="lin" valueType="num">
                                       <p:cBhvr>
-                                        <p:cTn id="109" dur="500" fill="hold"/>
-                                        <p:tgtEl>
-                                          <p:spTgt spid="93"/>
+                                        <p:cTn id="107" dur="500" fill="hold"/>
+                                        <p:tgtEl>
+                                          <p:spTgt spid="94"/>
                                         </p:tgtEl>
                                         <p:attrNameLst>
                                           <p:attrName>ppt_w</p:attrName>
@@ -10565,9 +10559,9 @@
                                     </p:anim>
                                     <p:anim calcmode="lin" valueType="num">
                                       <p:cBhvr>
-                                        <p:cTn id="110" dur="500" fill="hold"/>
-                                        <p:tgtEl>
-                                          <p:spTgt spid="93"/>
+                                        <p:cTn id="108" dur="500" fill="hold"/>
+                                        <p:tgtEl>
+                                          <p:spTgt spid="94"/>
                                         </p:tgtEl>
                                         <p:attrNameLst>
                                           <p:attrName>ppt_h</p:attrName>
@@ -10588,9 +10582,9 @@
                                     </p:anim>
                                     <p:animEffect transition="in" filter="fade">
                                       <p:cBhvr>
-                                        <p:cTn id="111" dur="500"/>
-                                        <p:tgtEl>
-                                          <p:spTgt spid="93"/>
+                                        <p:cTn id="109" dur="500"/>
+                                        <p:tgtEl>
+                                          <p:spTgt spid="94"/>
                                         </p:tgtEl>
                                       </p:cBhvr>
                                     </p:animEffect>
@@ -10598,20 +10592,20 @@
                                 </p:cTn>
                               </p:par>
                               <p:par>
-                                <p:cTn id="112" presetID="53" presetClass="entr" presetSubtype="16" fill="hold" grpId="0" nodeType="withEffect">
+                                <p:cTn id="110" presetID="53" presetClass="entr" presetSubtype="16" fill="hold" nodeType="withEffect">
                                   <p:stCondLst>
                                     <p:cond delay="0"/>
                                   </p:stCondLst>
                                   <p:childTnLst>
                                     <p:set>
                                       <p:cBhvr>
-                                        <p:cTn id="113" dur="1" fill="hold">
+                                        <p:cTn id="111" dur="1" fill="hold">
                                           <p:stCondLst>
                                             <p:cond delay="0"/>
                                           </p:stCondLst>
                                         </p:cTn>
                                         <p:tgtEl>
-                                          <p:spTgt spid="94"/>
+                                          <p:spTgt spid="306"/>
                                         </p:tgtEl>
                                         <p:attrNameLst>
                                           <p:attrName>style.visibility</p:attrName>
@@ -10623,9 +10617,9 @@
                                     </p:set>
                                     <p:anim calcmode="lin" valueType="num">
                                       <p:cBhvr>
-                                        <p:cTn id="114" dur="500" fill="hold"/>
-                                        <p:tgtEl>
-                                          <p:spTgt spid="94"/>
+                                        <p:cTn id="112" dur="500" fill="hold"/>
+                                        <p:tgtEl>
+                                          <p:spTgt spid="306"/>
                                         </p:tgtEl>
                                         <p:attrNameLst>
                                           <p:attrName>ppt_w</p:attrName>
@@ -10646,9 +10640,9 @@
                                     </p:anim>
                                     <p:anim calcmode="lin" valueType="num">
                                       <p:cBhvr>
-                                        <p:cTn id="115" dur="500" fill="hold"/>
-                                        <p:tgtEl>
-                                          <p:spTgt spid="94"/>
+                                        <p:cTn id="113" dur="500" fill="hold"/>
+                                        <p:tgtEl>
+                                          <p:spTgt spid="306"/>
                                         </p:tgtEl>
                                         <p:attrNameLst>
                                           <p:attrName>ppt_h</p:attrName>
@@ -10669,9 +10663,9 @@
                                     </p:anim>
                                     <p:animEffect transition="in" filter="fade">
                                       <p:cBhvr>
-                                        <p:cTn id="116" dur="500"/>
-                                        <p:tgtEl>
-                                          <p:spTgt spid="94"/>
+                                        <p:cTn id="114" dur="500"/>
+                                        <p:tgtEl>
+                                          <p:spTgt spid="306"/>
                                         </p:tgtEl>
                                       </p:cBhvr>
                                     </p:animEffect>
@@ -10679,20 +10673,20 @@
                                 </p:cTn>
                               </p:par>
                               <p:par>
-                                <p:cTn id="117" presetID="53" presetClass="entr" presetSubtype="16" fill="hold" nodeType="withEffect">
+                                <p:cTn id="115" presetID="53" presetClass="entr" presetSubtype="16" fill="hold" nodeType="withEffect">
                                   <p:stCondLst>
                                     <p:cond delay="0"/>
                                   </p:stCondLst>
                                   <p:childTnLst>
                                     <p:set>
                                       <p:cBhvr>
-                                        <p:cTn id="118" dur="1" fill="hold">
+                                        <p:cTn id="116" dur="1" fill="hold">
                                           <p:stCondLst>
                                             <p:cond delay="0"/>
                                           </p:stCondLst>
                                         </p:cTn>
                                         <p:tgtEl>
-                                          <p:spTgt spid="306"/>
+                                          <p:spTgt spid="188"/>
                                         </p:tgtEl>
                                         <p:attrNameLst>
                                           <p:attrName>style.visibility</p:attrName>
@@ -10704,9 +10698,9 @@
                                     </p:set>
                                     <p:anim calcmode="lin" valueType="num">
                                       <p:cBhvr>
-                                        <p:cTn id="119" dur="500" fill="hold"/>
-                                        <p:tgtEl>
-                                          <p:spTgt spid="306"/>
+                                        <p:cTn id="117" dur="500" fill="hold"/>
+                                        <p:tgtEl>
+                                          <p:spTgt spid="188"/>
                                         </p:tgtEl>
                                         <p:attrNameLst>
                                           <p:attrName>ppt_w</p:attrName>
@@ -10727,9 +10721,9 @@
                                     </p:anim>
                                     <p:anim calcmode="lin" valueType="num">
                                       <p:cBhvr>
-                                        <p:cTn id="120" dur="500" fill="hold"/>
-                                        <p:tgtEl>
-                                          <p:spTgt spid="306"/>
+                                        <p:cTn id="118" dur="500" fill="hold"/>
+                                        <p:tgtEl>
+                                          <p:spTgt spid="188"/>
                                         </p:tgtEl>
                                         <p:attrNameLst>
                                           <p:attrName>ppt_h</p:attrName>
@@ -10750,9 +10744,9 @@
                                     </p:anim>
                                     <p:animEffect transition="in" filter="fade">
                                       <p:cBhvr>
-                                        <p:cTn id="121" dur="500"/>
-                                        <p:tgtEl>
-                                          <p:spTgt spid="306"/>
+                                        <p:cTn id="119" dur="500"/>
+                                        <p:tgtEl>
+                                          <p:spTgt spid="188"/>
                                         </p:tgtEl>
                                       </p:cBhvr>
                                     </p:animEffect>
@@ -10760,20 +10754,20 @@
                                 </p:cTn>
                               </p:par>
                               <p:par>
-                                <p:cTn id="122" presetID="53" presetClass="entr" presetSubtype="16" fill="hold" nodeType="withEffect">
+                                <p:cTn id="120" presetID="53" presetClass="entr" presetSubtype="16" fill="hold" nodeType="withEffect">
                                   <p:stCondLst>
                                     <p:cond delay="0"/>
                                   </p:stCondLst>
                                   <p:childTnLst>
                                     <p:set>
                                       <p:cBhvr>
-                                        <p:cTn id="123" dur="1" fill="hold">
+                                        <p:cTn id="121" dur="1" fill="hold">
                                           <p:stCondLst>
                                             <p:cond delay="0"/>
                                           </p:stCondLst>
                                         </p:cTn>
                                         <p:tgtEl>
-                                          <p:spTgt spid="188"/>
+                                          <p:spTgt spid="195"/>
                                         </p:tgtEl>
                                         <p:attrNameLst>
                                           <p:attrName>style.visibility</p:attrName>
@@ -10785,9 +10779,9 @@
                                     </p:set>
                                     <p:anim calcmode="lin" valueType="num">
                                       <p:cBhvr>
-                                        <p:cTn id="124" dur="500" fill="hold"/>
-                                        <p:tgtEl>
-                                          <p:spTgt spid="188"/>
+                                        <p:cTn id="122" dur="500" fill="hold"/>
+                                        <p:tgtEl>
+                                          <p:spTgt spid="195"/>
                                         </p:tgtEl>
                                         <p:attrNameLst>
                                           <p:attrName>ppt_w</p:attrName>
@@ -10808,9 +10802,9 @@
                                     </p:anim>
                                     <p:anim calcmode="lin" valueType="num">
                                       <p:cBhvr>
-                                        <p:cTn id="125" dur="500" fill="hold"/>
-                                        <p:tgtEl>
-                                          <p:spTgt spid="188"/>
+                                        <p:cTn id="123" dur="500" fill="hold"/>
+                                        <p:tgtEl>
+                                          <p:spTgt spid="195"/>
                                         </p:tgtEl>
                                         <p:attrNameLst>
                                           <p:attrName>ppt_h</p:attrName>
@@ -10831,9 +10825,9 @@
                                     </p:anim>
                                     <p:animEffect transition="in" filter="fade">
                                       <p:cBhvr>
-                                        <p:cTn id="126" dur="500"/>
-                                        <p:tgtEl>
-                                          <p:spTgt spid="188"/>
+                                        <p:cTn id="124" dur="500"/>
+                                        <p:tgtEl>
+                                          <p:spTgt spid="195"/>
                                         </p:tgtEl>
                                       </p:cBhvr>
                                     </p:animEffect>
@@ -10841,20 +10835,20 @@
                                 </p:cTn>
                               </p:par>
                               <p:par>
-                                <p:cTn id="127" presetID="53" presetClass="entr" presetSubtype="16" fill="hold" nodeType="withEffect">
+                                <p:cTn id="125" presetID="53" presetClass="entr" presetSubtype="16" fill="hold" grpId="0" nodeType="withEffect">
                                   <p:stCondLst>
                                     <p:cond delay="0"/>
                                   </p:stCondLst>
                                   <p:childTnLst>
                                     <p:set>
                                       <p:cBhvr>
-                                        <p:cTn id="128" dur="1" fill="hold">
+                                        <p:cTn id="126" dur="1" fill="hold">
                                           <p:stCondLst>
                                             <p:cond delay="0"/>
                                           </p:stCondLst>
                                         </p:cTn>
                                         <p:tgtEl>
-                                          <p:spTgt spid="195"/>
+                                          <p:spTgt spid="52"/>
                                         </p:tgtEl>
                                         <p:attrNameLst>
                                           <p:attrName>style.visibility</p:attrName>
@@ -10866,9 +10860,9 @@
                                     </p:set>
                                     <p:anim calcmode="lin" valueType="num">
                                       <p:cBhvr>
-                                        <p:cTn id="129" dur="500" fill="hold"/>
-                                        <p:tgtEl>
-                                          <p:spTgt spid="195"/>
+                                        <p:cTn id="127" dur="500" fill="hold"/>
+                                        <p:tgtEl>
+                                          <p:spTgt spid="52"/>
                                         </p:tgtEl>
                                         <p:attrNameLst>
                                           <p:attrName>ppt_w</p:attrName>
@@ -10889,9 +10883,9 @@
                                     </p:anim>
                                     <p:anim calcmode="lin" valueType="num">
                                       <p:cBhvr>
-                                        <p:cTn id="130" dur="500" fill="hold"/>
-                                        <p:tgtEl>
-                                          <p:spTgt spid="195"/>
+                                        <p:cTn id="128" dur="500" fill="hold"/>
+                                        <p:tgtEl>
+                                          <p:spTgt spid="52"/>
                                         </p:tgtEl>
                                         <p:attrNameLst>
                                           <p:attrName>ppt_h</p:attrName>
@@ -10912,9 +10906,9 @@
                                     </p:anim>
                                     <p:animEffect transition="in" filter="fade">
                                       <p:cBhvr>
-                                        <p:cTn id="131" dur="500"/>
-                                        <p:tgtEl>
-                                          <p:spTgt spid="195"/>
+                                        <p:cTn id="129" dur="500"/>
+                                        <p:tgtEl>
+                                          <p:spTgt spid="52"/>
                                         </p:tgtEl>
                                       </p:cBhvr>
                                     </p:animEffect>
@@ -10922,20 +10916,20 @@
                                 </p:cTn>
                               </p:par>
                               <p:par>
-                                <p:cTn id="132" presetID="53" presetClass="entr" presetSubtype="16" fill="hold" grpId="0" nodeType="withEffect">
+                                <p:cTn id="130" presetID="53" presetClass="entr" presetSubtype="16" fill="hold" nodeType="withEffect">
                                   <p:stCondLst>
                                     <p:cond delay="0"/>
                                   </p:stCondLst>
                                   <p:childTnLst>
                                     <p:set>
                                       <p:cBhvr>
-                                        <p:cTn id="133" dur="1" fill="hold">
+                                        <p:cTn id="131" dur="1" fill="hold">
                                           <p:stCondLst>
                                             <p:cond delay="0"/>
                                           </p:stCondLst>
                                         </p:cTn>
                                         <p:tgtEl>
-                                          <p:spTgt spid="52"/>
+                                          <p:spTgt spid="55"/>
                                         </p:tgtEl>
                                         <p:attrNameLst>
                                           <p:attrName>style.visibility</p:attrName>
@@ -10947,9 +10941,9 @@
                                     </p:set>
                                     <p:anim calcmode="lin" valueType="num">
                                       <p:cBhvr>
-                                        <p:cTn id="134" dur="500" fill="hold"/>
-                                        <p:tgtEl>
-                                          <p:spTgt spid="52"/>
+                                        <p:cTn id="132" dur="500" fill="hold"/>
+                                        <p:tgtEl>
+                                          <p:spTgt spid="55"/>
                                         </p:tgtEl>
                                         <p:attrNameLst>
                                           <p:attrName>ppt_w</p:attrName>
@@ -10970,9 +10964,9 @@
                                     </p:anim>
                                     <p:anim calcmode="lin" valueType="num">
                                       <p:cBhvr>
-                                        <p:cTn id="135" dur="500" fill="hold"/>
-                                        <p:tgtEl>
-                                          <p:spTgt spid="52"/>
+                                        <p:cTn id="133" dur="500" fill="hold"/>
+                                        <p:tgtEl>
+                                          <p:spTgt spid="55"/>
                                         </p:tgtEl>
                                         <p:attrNameLst>
                                           <p:attrName>ppt_h</p:attrName>
@@ -10993,9 +10987,9 @@
                                     </p:anim>
                                     <p:animEffect transition="in" filter="fade">
                                       <p:cBhvr>
-                                        <p:cTn id="136" dur="500"/>
-                                        <p:tgtEl>
-                                          <p:spTgt spid="52"/>
+                                        <p:cTn id="134" dur="500"/>
+                                        <p:tgtEl>
+                                          <p:spTgt spid="55"/>
                                         </p:tgtEl>
                                       </p:cBhvr>
                                     </p:animEffect>
@@ -11003,20 +10997,20 @@
                                 </p:cTn>
                               </p:par>
                               <p:par>
-                                <p:cTn id="137" presetID="53" presetClass="entr" presetSubtype="16" fill="hold" nodeType="withEffect">
+                                <p:cTn id="135" presetID="53" presetClass="entr" presetSubtype="16" fill="hold" nodeType="withEffect">
                                   <p:stCondLst>
                                     <p:cond delay="0"/>
                                   </p:stCondLst>
                                   <p:childTnLst>
                                     <p:set>
                                       <p:cBhvr>
-                                        <p:cTn id="138" dur="1" fill="hold">
+                                        <p:cTn id="136" dur="1" fill="hold">
                                           <p:stCondLst>
                                             <p:cond delay="0"/>
                                           </p:stCondLst>
                                         </p:cTn>
                                         <p:tgtEl>
-                                          <p:spTgt spid="55"/>
+                                          <p:spTgt spid="66"/>
                                         </p:tgtEl>
                                         <p:attrNameLst>
                                           <p:attrName>style.visibility</p:attrName>
@@ -11028,9 +11022,9 @@
                                     </p:set>
                                     <p:anim calcmode="lin" valueType="num">
                                       <p:cBhvr>
-                                        <p:cTn id="139" dur="500" fill="hold"/>
-                                        <p:tgtEl>
-                                          <p:spTgt spid="55"/>
+                                        <p:cTn id="137" dur="500" fill="hold"/>
+                                        <p:tgtEl>
+                                          <p:spTgt spid="66"/>
                                         </p:tgtEl>
                                         <p:attrNameLst>
                                           <p:attrName>ppt_w</p:attrName>
@@ -11051,9 +11045,9 @@
                                     </p:anim>
                                     <p:anim calcmode="lin" valueType="num">
                                       <p:cBhvr>
-                                        <p:cTn id="140" dur="500" fill="hold"/>
-                                        <p:tgtEl>
-                                          <p:spTgt spid="55"/>
+                                        <p:cTn id="138" dur="500" fill="hold"/>
+                                        <p:tgtEl>
+                                          <p:spTgt spid="66"/>
                                         </p:tgtEl>
                                         <p:attrNameLst>
                                           <p:attrName>ppt_h</p:attrName>
@@ -11074,9 +11068,9 @@
                                     </p:anim>
                                     <p:animEffect transition="in" filter="fade">
                                       <p:cBhvr>
-                                        <p:cTn id="141" dur="500"/>
-                                        <p:tgtEl>
-                                          <p:spTgt spid="55"/>
+                                        <p:cTn id="139" dur="500"/>
+                                        <p:tgtEl>
+                                          <p:spTgt spid="66"/>
                                         </p:tgtEl>
                                       </p:cBhvr>
                                     </p:animEffect>
@@ -11084,20 +11078,20 @@
                                 </p:cTn>
                               </p:par>
                               <p:par>
-                                <p:cTn id="142" presetID="53" presetClass="entr" presetSubtype="16" fill="hold" nodeType="withEffect">
+                                <p:cTn id="140" presetID="53" presetClass="entr" presetSubtype="16" fill="hold" nodeType="withEffect">
                                   <p:stCondLst>
                                     <p:cond delay="0"/>
                                   </p:stCondLst>
                                   <p:childTnLst>
                                     <p:set>
                                       <p:cBhvr>
-                                        <p:cTn id="143" dur="1" fill="hold">
+                                        <p:cTn id="141" dur="1" fill="hold">
                                           <p:stCondLst>
                                             <p:cond delay="0"/>
                                           </p:stCondLst>
                                         </p:cTn>
                                         <p:tgtEl>
-                                          <p:spTgt spid="66"/>
+                                          <p:spTgt spid="84"/>
                                         </p:tgtEl>
                                         <p:attrNameLst>
                                           <p:attrName>style.visibility</p:attrName>
@@ -11109,9 +11103,9 @@
                                     </p:set>
                                     <p:anim calcmode="lin" valueType="num">
                                       <p:cBhvr>
-                                        <p:cTn id="144" dur="500" fill="hold"/>
-                                        <p:tgtEl>
-                                          <p:spTgt spid="66"/>
+                                        <p:cTn id="142" dur="500" fill="hold"/>
+                                        <p:tgtEl>
+                                          <p:spTgt spid="84"/>
                                         </p:tgtEl>
                                         <p:attrNameLst>
                                           <p:attrName>ppt_w</p:attrName>
@@ -11132,9 +11126,9 @@
                                     </p:anim>
                                     <p:anim calcmode="lin" valueType="num">
                                       <p:cBhvr>
-                                        <p:cTn id="145" dur="500" fill="hold"/>
-                                        <p:tgtEl>
-                                          <p:spTgt spid="66"/>
+                                        <p:cTn id="143" dur="500" fill="hold"/>
+                                        <p:tgtEl>
+                                          <p:spTgt spid="84"/>
                                         </p:tgtEl>
                                         <p:attrNameLst>
                                           <p:attrName>ppt_h</p:attrName>
@@ -11155,9 +11149,9 @@
                                     </p:anim>
                                     <p:animEffect transition="in" filter="fade">
                                       <p:cBhvr>
-                                        <p:cTn id="146" dur="500"/>
-                                        <p:tgtEl>
-                                          <p:spTgt spid="66"/>
+                                        <p:cTn id="144" dur="500"/>
+                                        <p:tgtEl>
+                                          <p:spTgt spid="84"/>
                                         </p:tgtEl>
                                       </p:cBhvr>
                                     </p:animEffect>
@@ -11165,20 +11159,20 @@
                                 </p:cTn>
                               </p:par>
                               <p:par>
-                                <p:cTn id="147" presetID="53" presetClass="entr" presetSubtype="16" fill="hold" nodeType="withEffect">
+                                <p:cTn id="145" presetID="53" presetClass="entr" presetSubtype="16" fill="hold" nodeType="withEffect">
                                   <p:stCondLst>
                                     <p:cond delay="0"/>
                                   </p:stCondLst>
                                   <p:childTnLst>
                                     <p:set>
                                       <p:cBhvr>
-                                        <p:cTn id="148" dur="1" fill="hold">
+                                        <p:cTn id="146" dur="1" fill="hold">
                                           <p:stCondLst>
                                             <p:cond delay="0"/>
                                           </p:stCondLst>
                                         </p:cTn>
                                         <p:tgtEl>
-                                          <p:spTgt spid="84"/>
+                                          <p:spTgt spid="118"/>
                                         </p:tgtEl>
                                         <p:attrNameLst>
                                           <p:attrName>style.visibility</p:attrName>
@@ -11190,9 +11184,9 @@
                                     </p:set>
                                     <p:anim calcmode="lin" valueType="num">
                                       <p:cBhvr>
-                                        <p:cTn id="149" dur="500" fill="hold"/>
-                                        <p:tgtEl>
-                                          <p:spTgt spid="84"/>
+                                        <p:cTn id="147" dur="500" fill="hold"/>
+                                        <p:tgtEl>
+                                          <p:spTgt spid="118"/>
                                         </p:tgtEl>
                                         <p:attrNameLst>
                                           <p:attrName>ppt_w</p:attrName>
@@ -11213,9 +11207,9 @@
                                     </p:anim>
                                     <p:anim calcmode="lin" valueType="num">
                                       <p:cBhvr>
-                                        <p:cTn id="150" dur="500" fill="hold"/>
-                                        <p:tgtEl>
-                                          <p:spTgt spid="84"/>
+                                        <p:cTn id="148" dur="500" fill="hold"/>
+                                        <p:tgtEl>
+                                          <p:spTgt spid="118"/>
                                         </p:tgtEl>
                                         <p:attrNameLst>
                                           <p:attrName>ppt_h</p:attrName>
@@ -11236,9 +11230,9 @@
                                     </p:anim>
                                     <p:animEffect transition="in" filter="fade">
                                       <p:cBhvr>
-                                        <p:cTn id="151" dur="500"/>
-                                        <p:tgtEl>
-                                          <p:spTgt spid="84"/>
+                                        <p:cTn id="149" dur="500"/>
+                                        <p:tgtEl>
+                                          <p:spTgt spid="118"/>
                                         </p:tgtEl>
                                       </p:cBhvr>
                                     </p:animEffect>
@@ -11246,20 +11240,20 @@
                                 </p:cTn>
                               </p:par>
                               <p:par>
-                                <p:cTn id="152" presetID="53" presetClass="entr" presetSubtype="16" fill="hold" nodeType="withEffect">
+                                <p:cTn id="150" presetID="53" presetClass="entr" presetSubtype="16" fill="hold" grpId="0" nodeType="withEffect">
                                   <p:stCondLst>
                                     <p:cond delay="0"/>
                                   </p:stCondLst>
                                   <p:childTnLst>
                                     <p:set>
                                       <p:cBhvr>
-                                        <p:cTn id="153" dur="1" fill="hold">
+                                        <p:cTn id="151" dur="1" fill="hold">
                                           <p:stCondLst>
                                             <p:cond delay="0"/>
                                           </p:stCondLst>
                                         </p:cTn>
                                         <p:tgtEl>
-                                          <p:spTgt spid="118"/>
+                                          <p:spTgt spid="145"/>
                                         </p:tgtEl>
                                         <p:attrNameLst>
                                           <p:attrName>style.visibility</p:attrName>
@@ -11271,9 +11265,9 @@
                                     </p:set>
                                     <p:anim calcmode="lin" valueType="num">
                                       <p:cBhvr>
-                                        <p:cTn id="154" dur="500" fill="hold"/>
-                                        <p:tgtEl>
-                                          <p:spTgt spid="118"/>
+                                        <p:cTn id="152" dur="500" fill="hold"/>
+                                        <p:tgtEl>
+                                          <p:spTgt spid="145"/>
                                         </p:tgtEl>
                                         <p:attrNameLst>
                                           <p:attrName>ppt_w</p:attrName>
@@ -11294,9 +11288,9 @@
                                     </p:anim>
                                     <p:anim calcmode="lin" valueType="num">
                                       <p:cBhvr>
-                                        <p:cTn id="155" dur="500" fill="hold"/>
-                                        <p:tgtEl>
-                                          <p:spTgt spid="118"/>
+                                        <p:cTn id="153" dur="500" fill="hold"/>
+                                        <p:tgtEl>
+                                          <p:spTgt spid="145"/>
                                         </p:tgtEl>
                                         <p:attrNameLst>
                                           <p:attrName>ppt_h</p:attrName>
@@ -11317,9 +11311,9 @@
                                     </p:anim>
                                     <p:animEffect transition="in" filter="fade">
                                       <p:cBhvr>
-                                        <p:cTn id="156" dur="500"/>
-                                        <p:tgtEl>
-                                          <p:spTgt spid="118"/>
+                                        <p:cTn id="154" dur="500"/>
+                                        <p:tgtEl>
+                                          <p:spTgt spid="145"/>
                                         </p:tgtEl>
                                       </p:cBhvr>
                                     </p:animEffect>
@@ -11327,20 +11321,20 @@
                                 </p:cTn>
                               </p:par>
                               <p:par>
-                                <p:cTn id="157" presetID="53" presetClass="entr" presetSubtype="16" fill="hold" grpId="0" nodeType="withEffect">
+                                <p:cTn id="155" presetID="53" presetClass="entr" presetSubtype="16" fill="hold" nodeType="withEffect">
                                   <p:stCondLst>
                                     <p:cond delay="0"/>
                                   </p:stCondLst>
                                   <p:childTnLst>
                                     <p:set>
                                       <p:cBhvr>
-                                        <p:cTn id="158" dur="1" fill="hold">
+                                        <p:cTn id="156" dur="1" fill="hold">
                                           <p:stCondLst>
                                             <p:cond delay="0"/>
                                           </p:stCondLst>
                                         </p:cTn>
                                         <p:tgtEl>
-                                          <p:spTgt spid="145"/>
+                                          <p:spTgt spid="146"/>
                                         </p:tgtEl>
                                         <p:attrNameLst>
                                           <p:attrName>style.visibility</p:attrName>
@@ -11352,9 +11346,9 @@
                                     </p:set>
                                     <p:anim calcmode="lin" valueType="num">
                                       <p:cBhvr>
-                                        <p:cTn id="159" dur="500" fill="hold"/>
-                                        <p:tgtEl>
-                                          <p:spTgt spid="145"/>
+                                        <p:cTn id="157" dur="500" fill="hold"/>
+                                        <p:tgtEl>
+                                          <p:spTgt spid="146"/>
                                         </p:tgtEl>
                                         <p:attrNameLst>
                                           <p:attrName>ppt_w</p:attrName>
@@ -11375,9 +11369,9 @@
                                     </p:anim>
                                     <p:anim calcmode="lin" valueType="num">
                                       <p:cBhvr>
-                                        <p:cTn id="160" dur="500" fill="hold"/>
-                                        <p:tgtEl>
-                                          <p:spTgt spid="145"/>
+                                        <p:cTn id="158" dur="500" fill="hold"/>
+                                        <p:tgtEl>
+                                          <p:spTgt spid="146"/>
                                         </p:tgtEl>
                                         <p:attrNameLst>
                                           <p:attrName>ppt_h</p:attrName>
@@ -11398,9 +11392,9 @@
                                     </p:anim>
                                     <p:animEffect transition="in" filter="fade">
                                       <p:cBhvr>
-                                        <p:cTn id="161" dur="500"/>
-                                        <p:tgtEl>
-                                          <p:spTgt spid="145"/>
+                                        <p:cTn id="159" dur="500"/>
+                                        <p:tgtEl>
+                                          <p:spTgt spid="146"/>
                                         </p:tgtEl>
                                       </p:cBhvr>
                                     </p:animEffect>
@@ -11408,20 +11402,20 @@
                                 </p:cTn>
                               </p:par>
                               <p:par>
-                                <p:cTn id="162" presetID="53" presetClass="entr" presetSubtype="16" fill="hold" nodeType="withEffect">
+                                <p:cTn id="160" presetID="53" presetClass="entr" presetSubtype="16" fill="hold" nodeType="withEffect">
                                   <p:stCondLst>
                                     <p:cond delay="0"/>
                                   </p:stCondLst>
                                   <p:childTnLst>
                                     <p:set>
                                       <p:cBhvr>
-                                        <p:cTn id="163" dur="1" fill="hold">
+                                        <p:cTn id="161" dur="1" fill="hold">
                                           <p:stCondLst>
                                             <p:cond delay="0"/>
                                           </p:stCondLst>
                                         </p:cTn>
                                         <p:tgtEl>
-                                          <p:spTgt spid="146"/>
+                                          <p:spTgt spid="159"/>
                                         </p:tgtEl>
                                         <p:attrNameLst>
                                           <p:attrName>style.visibility</p:attrName>
@@ -11433,9 +11427,9 @@
                                     </p:set>
                                     <p:anim calcmode="lin" valueType="num">
                                       <p:cBhvr>
-                                        <p:cTn id="164" dur="500" fill="hold"/>
-                                        <p:tgtEl>
-                                          <p:spTgt spid="146"/>
+                                        <p:cTn id="162" dur="500" fill="hold"/>
+                                        <p:tgtEl>
+                                          <p:spTgt spid="159"/>
                                         </p:tgtEl>
                                         <p:attrNameLst>
                                           <p:attrName>ppt_w</p:attrName>
@@ -11456,9 +11450,9 @@
                                     </p:anim>
                                     <p:anim calcmode="lin" valueType="num">
                                       <p:cBhvr>
-                                        <p:cTn id="165" dur="500" fill="hold"/>
-                                        <p:tgtEl>
-                                          <p:spTgt spid="146"/>
+                                        <p:cTn id="163" dur="500" fill="hold"/>
+                                        <p:tgtEl>
+                                          <p:spTgt spid="159"/>
                                         </p:tgtEl>
                                         <p:attrNameLst>
                                           <p:attrName>ppt_h</p:attrName>
@@ -11479,9 +11473,9 @@
                                     </p:anim>
                                     <p:animEffect transition="in" filter="fade">
                                       <p:cBhvr>
-                                        <p:cTn id="166" dur="500"/>
-                                        <p:tgtEl>
-                                          <p:spTgt spid="146"/>
+                                        <p:cTn id="164" dur="500"/>
+                                        <p:tgtEl>
+                                          <p:spTgt spid="159"/>
                                         </p:tgtEl>
                                       </p:cBhvr>
                                     </p:animEffect>
@@ -11489,20 +11483,20 @@
                                 </p:cTn>
                               </p:par>
                               <p:par>
-                                <p:cTn id="167" presetID="53" presetClass="entr" presetSubtype="16" fill="hold" nodeType="withEffect">
+                                <p:cTn id="165" presetID="53" presetClass="entr" presetSubtype="16" fill="hold" nodeType="withEffect">
                                   <p:stCondLst>
                                     <p:cond delay="0"/>
                                   </p:stCondLst>
                                   <p:childTnLst>
                                     <p:set>
                                       <p:cBhvr>
-                                        <p:cTn id="168" dur="1" fill="hold">
+                                        <p:cTn id="166" dur="1" fill="hold">
                                           <p:stCondLst>
                                             <p:cond delay="0"/>
                                           </p:stCondLst>
                                         </p:cTn>
                                         <p:tgtEl>
-                                          <p:spTgt spid="159"/>
+                                          <p:spTgt spid="170"/>
                                         </p:tgtEl>
                                         <p:attrNameLst>
                                           <p:attrName>style.visibility</p:attrName>
@@ -11514,9 +11508,9 @@
                                     </p:set>
                                     <p:anim calcmode="lin" valueType="num">
                                       <p:cBhvr>
-                                        <p:cTn id="169" dur="500" fill="hold"/>
-                                        <p:tgtEl>
-                                          <p:spTgt spid="159"/>
+                                        <p:cTn id="167" dur="500" fill="hold"/>
+                                        <p:tgtEl>
+                                          <p:spTgt spid="170"/>
                                         </p:tgtEl>
                                         <p:attrNameLst>
                                           <p:attrName>ppt_w</p:attrName>
@@ -11537,9 +11531,9 @@
                                     </p:anim>
                                     <p:anim calcmode="lin" valueType="num">
                                       <p:cBhvr>
-                                        <p:cTn id="170" dur="500" fill="hold"/>
-                                        <p:tgtEl>
-                                          <p:spTgt spid="159"/>
+                                        <p:cTn id="168" dur="500" fill="hold"/>
+                                        <p:tgtEl>
+                                          <p:spTgt spid="170"/>
                                         </p:tgtEl>
                                         <p:attrNameLst>
                                           <p:attrName>ppt_h</p:attrName>
@@ -11560,9 +11554,9 @@
                                     </p:anim>
                                     <p:animEffect transition="in" filter="fade">
                                       <p:cBhvr>
-                                        <p:cTn id="171" dur="500"/>
-                                        <p:tgtEl>
-                                          <p:spTgt spid="159"/>
+                                        <p:cTn id="169" dur="500"/>
+                                        <p:tgtEl>
+                                          <p:spTgt spid="170"/>
                                         </p:tgtEl>
                                       </p:cBhvr>
                                     </p:animEffect>
@@ -11570,20 +11564,20 @@
                                 </p:cTn>
                               </p:par>
                               <p:par>
-                                <p:cTn id="172" presetID="53" presetClass="entr" presetSubtype="16" fill="hold" nodeType="withEffect">
+                                <p:cTn id="170" presetID="53" presetClass="entr" presetSubtype="16" fill="hold" grpId="0" nodeType="withEffect">
                                   <p:stCondLst>
                                     <p:cond delay="0"/>
                                   </p:stCondLst>
                                   <p:childTnLst>
                                     <p:set>
                                       <p:cBhvr>
-                                        <p:cTn id="173" dur="1" fill="hold">
+                                        <p:cTn id="171" dur="1" fill="hold">
                                           <p:stCondLst>
                                             <p:cond delay="0"/>
                                           </p:stCondLst>
                                         </p:cTn>
                                         <p:tgtEl>
-                                          <p:spTgt spid="170"/>
+                                          <p:spTgt spid="45"/>
                                         </p:tgtEl>
                                         <p:attrNameLst>
                                           <p:attrName>style.visibility</p:attrName>
@@ -11595,9 +11589,9 @@
                                     </p:set>
                                     <p:anim calcmode="lin" valueType="num">
                                       <p:cBhvr>
-                                        <p:cTn id="174" dur="500" fill="hold"/>
-                                        <p:tgtEl>
-                                          <p:spTgt spid="170"/>
+                                        <p:cTn id="172" dur="500" fill="hold"/>
+                                        <p:tgtEl>
+                                          <p:spTgt spid="45"/>
                                         </p:tgtEl>
                                         <p:attrNameLst>
                                           <p:attrName>ppt_w</p:attrName>
@@ -11618,9 +11612,9 @@
                                     </p:anim>
                                     <p:anim calcmode="lin" valueType="num">
                                       <p:cBhvr>
-                                        <p:cTn id="175" dur="500" fill="hold"/>
-                                        <p:tgtEl>
-                                          <p:spTgt spid="170"/>
+                                        <p:cTn id="173" dur="500" fill="hold"/>
+                                        <p:tgtEl>
+                                          <p:spTgt spid="45"/>
                                         </p:tgtEl>
                                         <p:attrNameLst>
                                           <p:attrName>ppt_h</p:attrName>
@@ -11641,9 +11635,171 @@
                                     </p:anim>
                                     <p:animEffect transition="in" filter="fade">
                                       <p:cBhvr>
-                                        <p:cTn id="176" dur="500"/>
-                                        <p:tgtEl>
-                                          <p:spTgt spid="170"/>
+                                        <p:cTn id="174" dur="500"/>
+                                        <p:tgtEl>
+                                          <p:spTgt spid="45"/>
+                                        </p:tgtEl>
+                                      </p:cBhvr>
+                                    </p:animEffect>
+                                  </p:childTnLst>
+                                </p:cTn>
+                              </p:par>
+                              <p:par>
+                                <p:cTn id="175" presetID="53" presetClass="entr" presetSubtype="16" fill="hold" grpId="0" nodeType="withEffect">
+                                  <p:stCondLst>
+                                    <p:cond delay="0"/>
+                                  </p:stCondLst>
+                                  <p:childTnLst>
+                                    <p:set>
+                                      <p:cBhvr>
+                                        <p:cTn id="176" dur="1" fill="hold">
+                                          <p:stCondLst>
+                                            <p:cond delay="0"/>
+                                          </p:stCondLst>
+                                        </p:cTn>
+                                        <p:tgtEl>
+                                          <p:spTgt spid="43"/>
+                                        </p:tgtEl>
+                                        <p:attrNameLst>
+                                          <p:attrName>style.visibility</p:attrName>
+                                        </p:attrNameLst>
+                                      </p:cBhvr>
+                                      <p:to>
+                                        <p:strVal val="visible"/>
+                                      </p:to>
+                                    </p:set>
+                                    <p:anim calcmode="lin" valueType="num">
+                                      <p:cBhvr>
+                                        <p:cTn id="177" dur="500" fill="hold"/>
+                                        <p:tgtEl>
+                                          <p:spTgt spid="43"/>
+                                        </p:tgtEl>
+                                        <p:attrNameLst>
+                                          <p:attrName>ppt_w</p:attrName>
+                                        </p:attrNameLst>
+                                      </p:cBhvr>
+                                      <p:tavLst>
+                                        <p:tav tm="0">
+                                          <p:val>
+                                            <p:fltVal val="0"/>
+                                          </p:val>
+                                        </p:tav>
+                                        <p:tav tm="100000">
+                                          <p:val>
+                                            <p:strVal val="#ppt_w"/>
+                                          </p:val>
+                                        </p:tav>
+                                      </p:tavLst>
+                                    </p:anim>
+                                    <p:anim calcmode="lin" valueType="num">
+                                      <p:cBhvr>
+                                        <p:cTn id="178" dur="500" fill="hold"/>
+                                        <p:tgtEl>
+                                          <p:spTgt spid="43"/>
+                                        </p:tgtEl>
+                                        <p:attrNameLst>
+                                          <p:attrName>ppt_h</p:attrName>
+                                        </p:attrNameLst>
+                                      </p:cBhvr>
+                                      <p:tavLst>
+                                        <p:tav tm="0">
+                                          <p:val>
+                                            <p:fltVal val="0"/>
+                                          </p:val>
+                                        </p:tav>
+                                        <p:tav tm="100000">
+                                          <p:val>
+                                            <p:strVal val="#ppt_h"/>
+                                          </p:val>
+                                        </p:tav>
+                                      </p:tavLst>
+                                    </p:anim>
+                                    <p:animEffect transition="in" filter="fade">
+                                      <p:cBhvr>
+                                        <p:cTn id="179" dur="500"/>
+                                        <p:tgtEl>
+                                          <p:spTgt spid="43"/>
+                                        </p:tgtEl>
+                                      </p:cBhvr>
+                                    </p:animEffect>
+                                  </p:childTnLst>
+                                </p:cTn>
+                              </p:par>
+                              <p:par>
+                                <p:cTn id="180" presetID="53" presetClass="entr" presetSubtype="16" fill="hold" grpId="0" nodeType="withEffect">
+                                  <p:stCondLst>
+                                    <p:cond delay="0"/>
+                                  </p:stCondLst>
+                                  <p:childTnLst>
+                                    <p:set>
+                                      <p:cBhvr>
+                                        <p:cTn id="181" dur="1" fill="hold">
+                                          <p:stCondLst>
+                                            <p:cond delay="0"/>
+                                          </p:stCondLst>
+                                        </p:cTn>
+                                        <p:tgtEl>
+                                          <p:spTgt spid="44"/>
+                                        </p:tgtEl>
+                                        <p:attrNameLst>
+                                          <p:attrName>style.visibility</p:attrName>
+                                        </p:attrNameLst>
+                                      </p:cBhvr>
+                                      <p:to>
+                                        <p:strVal val="visible"/>
+                                      </p:to>
+                                    </p:set>
+                                    <p:anim calcmode="lin" valueType="num">
+                                      <p:cBhvr>
+                                        <p:cTn id="182" dur="500" fill="hold"/>
+                                        <p:tgtEl>
+                                          <p:spTgt spid="44"/>
+                                        </p:tgtEl>
+                                        <p:attrNameLst>
+                                          <p:attrName>ppt_w</p:attrName>
+                                        </p:attrNameLst>
+                                      </p:cBhvr>
+                                      <p:tavLst>
+                                        <p:tav tm="0">
+                                          <p:val>
+                                            <p:fltVal val="0"/>
+                                          </p:val>
+                                        </p:tav>
+                                        <p:tav tm="100000">
+                                          <p:val>
+                                            <p:strVal val="#ppt_w"/>
+                                          </p:val>
+                                        </p:tav>
+                                      </p:tavLst>
+                                    </p:anim>
+                                    <p:anim calcmode="lin" valueType="num">
+                                      <p:cBhvr>
+                                        <p:cTn id="183" dur="500" fill="hold"/>
+                                        <p:tgtEl>
+                                          <p:spTgt spid="44"/>
+                                        </p:tgtEl>
+                                        <p:attrNameLst>
+                                          <p:attrName>ppt_h</p:attrName>
+                                        </p:attrNameLst>
+                                      </p:cBhvr>
+                                      <p:tavLst>
+                                        <p:tav tm="0">
+                                          <p:val>
+                                            <p:fltVal val="0"/>
+                                          </p:val>
+                                        </p:tav>
+                                        <p:tav tm="100000">
+                                          <p:val>
+                                            <p:strVal val="#ppt_h"/>
+                                          </p:val>
+                                        </p:tav>
+                                      </p:tavLst>
+                                    </p:anim>
+                                    <p:animEffect transition="in" filter="fade">
+                                      <p:cBhvr>
+                                        <p:cTn id="184" dur="500"/>
+                                        <p:tgtEl>
+                                          <p:spTgt spid="44"/>
                                         </p:tgtEl>
                                       </p:cBhvr>
                                     </p:animEffect>
@@ -11657,32 +11813,32 @@
                     </p:cTn>
                   </p:par>
                   <p:par>
-                    <p:cTn id="177" fill="hold">
+                    <p:cTn id="185" fill="hold">
                       <p:stCondLst>
                         <p:cond delay="indefinite"/>
                       </p:stCondLst>
                       <p:childTnLst>
                         <p:par>
-                          <p:cTn id="178" fill="hold">
+                          <p:cTn id="186" fill="hold">
                             <p:stCondLst>
                               <p:cond delay="0"/>
                             </p:stCondLst>
                             <p:childTnLst>
                               <p:par>
-                                <p:cTn id="179" presetID="53" presetClass="entr" presetSubtype="16" fill="hold" grpId="0" nodeType="clickEffect">
+                                <p:cTn id="187" presetID="53" presetClass="entr" presetSubtype="16" fill="hold" grpId="0" nodeType="clickEffect">
                                   <p:stCondLst>
                                     <p:cond delay="0"/>
                                   </p:stCondLst>
                                   <p:childTnLst>
                                     <p:set>
                                       <p:cBhvr>
-                                        <p:cTn id="180" dur="1" fill="hold">
+                                        <p:cTn id="188" dur="1" fill="hold">
                                           <p:stCondLst>
                                             <p:cond delay="0"/>
                                           </p:stCondLst>
                                         </p:cTn>
                                         <p:tgtEl>
-                                          <p:spTgt spid="45"/>
+                                          <p:spTgt spid="50"/>
                                         </p:tgtEl>
                                         <p:attrNameLst>
                                           <p:attrName>style.visibility</p:attrName>
@@ -11694,9 +11850,9 @@
                                     </p:set>
                                     <p:anim calcmode="lin" valueType="num">
                                       <p:cBhvr>
-                                        <p:cTn id="181" dur="500" fill="hold"/>
-                                        <p:tgtEl>
-                                          <p:spTgt spid="45"/>
+                                        <p:cTn id="189" dur="500" fill="hold"/>
+                                        <p:tgtEl>
+                                          <p:spTgt spid="50"/>
                                         </p:tgtEl>
                                         <p:attrNameLst>
                                           <p:attrName>ppt_w</p:attrName>
@@ -11717,9 +11873,9 @@
                                     </p:anim>
                                     <p:anim calcmode="lin" valueType="num">
                                       <p:cBhvr>
-                                        <p:cTn id="182" dur="500" fill="hold"/>
-                                        <p:tgtEl>
-                                          <p:spTgt spid="45"/>
+                                        <p:cTn id="190" dur="500" fill="hold"/>
+                                        <p:tgtEl>
+                                          <p:spTgt spid="50"/>
                                         </p:tgtEl>
                                         <p:attrNameLst>
                                           <p:attrName>ppt_h</p:attrName>
@@ -11740,9 +11896,9 @@
                                     </p:anim>
                                     <p:animEffect transition="in" filter="fade">
                                       <p:cBhvr>
-                                        <p:cTn id="183" dur="500"/>
-                                        <p:tgtEl>
-                                          <p:spTgt spid="45"/>
+                                        <p:cTn id="191" dur="500"/>
+                                        <p:tgtEl>
+                                          <p:spTgt spid="50"/>
                                         </p:tgtEl>
                                       </p:cBhvr>
                                     </p:animEffect>
@@ -11750,20 +11906,20 @@
                                 </p:cTn>
                               </p:par>
                               <p:par>
-                                <p:cTn id="184" presetID="53" presetClass="entr" presetSubtype="16" fill="hold" grpId="0" nodeType="withEffect">
+                                <p:cTn id="192" presetID="53" presetClass="entr" presetSubtype="16" fill="hold" grpId="0" nodeType="withEffect">
                                   <p:stCondLst>
                                     <p:cond delay="0"/>
                                   </p:stCondLst>
                                   <p:childTnLst>
                                     <p:set>
                                       <p:cBhvr>
-                                        <p:cTn id="185" dur="1" fill="hold">
+                                        <p:cTn id="193" dur="1" fill="hold">
                                           <p:stCondLst>
                                             <p:cond delay="0"/>
                                           </p:stCondLst>
                                         </p:cTn>
                                         <p:tgtEl>
-                                          <p:spTgt spid="43"/>
+                                          <p:spTgt spid="48"/>
                                         </p:tgtEl>
                                         <p:attrNameLst>
                                           <p:attrName>style.visibility</p:attrName>
@@ -11775,9 +11931,9 @@
                                     </p:set>
                                     <p:anim calcmode="lin" valueType="num">
                                       <p:cBhvr>
-                                        <p:cTn id="186" dur="500" fill="hold"/>
-                                        <p:tgtEl>
-                                          <p:spTgt spid="43"/>
+                                        <p:cTn id="194" dur="500" fill="hold"/>
+                                        <p:tgtEl>
+                                          <p:spTgt spid="48"/>
                                         </p:tgtEl>
                                         <p:attrNameLst>
                                           <p:attrName>ppt_w</p:attrName>
@@ -11798,9 +11954,9 @@
                                     </p:anim>
                                     <p:anim calcmode="lin" valueType="num">
                                       <p:cBhvr>
-                                        <p:cTn id="187" dur="500" fill="hold"/>
-                                        <p:tgtEl>
-                                          <p:spTgt spid="43"/>
+                                        <p:cTn id="195" dur="500" fill="hold"/>
+                                        <p:tgtEl>
+                                          <p:spTgt spid="48"/>
                                         </p:tgtEl>
                                         <p:attrNameLst>
                                           <p:attrName>ppt_h</p:attrName>
@@ -11821,9 +11977,9 @@
                                     </p:anim>
                                     <p:animEffect transition="in" filter="fade">
                                       <p:cBhvr>
-                                        <p:cTn id="188" dur="500"/>
-                                        <p:tgtEl>
-                                          <p:spTgt spid="43"/>
+                                        <p:cTn id="196" dur="500"/>
+                                        <p:tgtEl>
+                                          <p:spTgt spid="48"/>
                                         </p:tgtEl>
                                       </p:cBhvr>
                                     </p:animEffect>
@@ -11831,20 +11987,20 @@
                                 </p:cTn>
                               </p:par>
                               <p:par>
-                                <p:cTn id="189" presetID="53" presetClass="entr" presetSubtype="16" fill="hold" grpId="0" nodeType="withEffect">
+                                <p:cTn id="197" presetID="53" presetClass="entr" presetSubtype="16" fill="hold" grpId="0" nodeType="withEffect">
                                   <p:stCondLst>
                                     <p:cond delay="0"/>
                                   </p:stCondLst>
                                   <p:childTnLst>
                                     <p:set>
                                       <p:cBhvr>
-                                        <p:cTn id="190" dur="1" fill="hold">
+                                        <p:cTn id="198" dur="1" fill="hold">
                                           <p:stCondLst>
                                             <p:cond delay="0"/>
                                           </p:stCondLst>
                                         </p:cTn>
                                         <p:tgtEl>
-                                          <p:spTgt spid="44"/>
+                                          <p:spTgt spid="49"/>
                                         </p:tgtEl>
                                         <p:attrNameLst>
                                           <p:attrName>style.visibility</p:attrName>
@@ -11856,9 +12012,9 @@
                                     </p:set>
                                     <p:anim calcmode="lin" valueType="num">
                                       <p:cBhvr>
-                                        <p:cTn id="191" dur="500" fill="hold"/>
-                                        <p:tgtEl>
-                                          <p:spTgt spid="44"/>
+                                        <p:cTn id="199" dur="500" fill="hold"/>
+                                        <p:tgtEl>
+                                          <p:spTgt spid="49"/>
                                         </p:tgtEl>
                                         <p:attrNameLst>
                                           <p:attrName>ppt_w</p:attrName>
@@ -11879,9 +12035,9 @@
                                     </p:anim>
                                     <p:anim calcmode="lin" valueType="num">
                                       <p:cBhvr>
-                                        <p:cTn id="192" dur="500" fill="hold"/>
-                                        <p:tgtEl>
-                                          <p:spTgt spid="44"/>
+                                        <p:cTn id="200" dur="500" fill="hold"/>
+                                        <p:tgtEl>
+                                          <p:spTgt spid="49"/>
                                         </p:tgtEl>
                                         <p:attrNameLst>
                                           <p:attrName>ppt_h</p:attrName>
@@ -11902,9 +12058,9 @@
                                     </p:anim>
                                     <p:animEffect transition="in" filter="fade">
                                       <p:cBhvr>
-                                        <p:cTn id="193" dur="500"/>
-                                        <p:tgtEl>
-                                          <p:spTgt spid="44"/>
+                                        <p:cTn id="201" dur="500"/>
+                                        <p:tgtEl>
+                                          <p:spTgt spid="49"/>
                                         </p:tgtEl>
                                       </p:cBhvr>
                                     </p:animEffect>
@@ -11918,32 +12074,32 @@
                     </p:cTn>
                   </p:par>
                   <p:par>
-                    <p:cTn id="194" fill="hold">
+                    <p:cTn id="202" fill="hold">
                       <p:stCondLst>
                         <p:cond delay="indefinite"/>
                       </p:stCondLst>
                       <p:childTnLst>
                         <p:par>
-                          <p:cTn id="195" fill="hold">
+                          <p:cTn id="203" fill="hold">
                             <p:stCondLst>
                               <p:cond delay="0"/>
                             </p:stCondLst>
                             <p:childTnLst>
                               <p:par>
-                                <p:cTn id="196" presetID="53" presetClass="entr" presetSubtype="16" fill="hold" grpId="0" nodeType="clickEffect">
+                                <p:cTn id="204" presetID="53" presetClass="entr" presetSubtype="16" fill="hold" grpId="0" nodeType="clickEffect">
                                   <p:stCondLst>
                                     <p:cond delay="0"/>
                                   </p:stCondLst>
                                   <p:childTnLst>
                                     <p:set>
                                       <p:cBhvr>
-                                        <p:cTn id="197" dur="1" fill="hold">
+                                        <p:cTn id="205" dur="1" fill="hold">
                                           <p:stCondLst>
                                             <p:cond delay="0"/>
                                           </p:stCondLst>
                                         </p:cTn>
                                         <p:tgtEl>
-                                          <p:spTgt spid="50"/>
+                                          <p:spTgt spid="169"/>
                                         </p:tgtEl>
                                         <p:attrNameLst>
                                           <p:attrName>style.visibility</p:attrName>
@@ -11955,9 +12111,9 @@
                                     </p:set>
                                     <p:anim calcmode="lin" valueType="num">
                                       <p:cBhvr>
-                                        <p:cTn id="198" dur="500" fill="hold"/>
-                                        <p:tgtEl>
-                                          <p:spTgt spid="50"/>
+                                        <p:cTn id="206" dur="500" fill="hold"/>
+                                        <p:tgtEl>
+                                          <p:spTgt spid="169"/>
                                         </p:tgtEl>
                                         <p:attrNameLst>
                                           <p:attrName>ppt_w</p:attrName>
@@ -11978,9 +12134,9 @@
                                     </p:anim>
                                     <p:anim calcmode="lin" valueType="num">
                                       <p:cBhvr>
-                                        <p:cTn id="199" dur="500" fill="hold"/>
-                                        <p:tgtEl>
-                                          <p:spTgt spid="50"/>
+                                        <p:cTn id="207" dur="500" fill="hold"/>
+                                        <p:tgtEl>
+                                          <p:spTgt spid="169"/>
                                         </p:tgtEl>
                                         <p:attrNameLst>
                                           <p:attrName>ppt_h</p:attrName>
@@ -12001,9 +12157,9 @@
                                     </p:anim>
                                     <p:animEffect transition="in" filter="fade">
                                       <p:cBhvr>
-                                        <p:cTn id="200" dur="500"/>
-                                        <p:tgtEl>
-                                          <p:spTgt spid="50"/>
+                                        <p:cTn id="208" dur="500"/>
+                                        <p:tgtEl>
+                                          <p:spTgt spid="169"/>
                                         </p:tgtEl>
                                       </p:cBhvr>
                                     </p:animEffect>
@@ -12011,20 +12167,20 @@
                                 </p:cTn>
                               </p:par>
                               <p:par>
-                                <p:cTn id="201" presetID="53" presetClass="entr" presetSubtype="16" fill="hold" grpId="0" nodeType="withEffect">
+                                <p:cTn id="209" presetID="53" presetClass="entr" presetSubtype="16" fill="hold" grpId="0" nodeType="withEffect">
                                   <p:stCondLst>
                                     <p:cond delay="0"/>
                                   </p:stCondLst>
                                   <p:childTnLst>
                                     <p:set>
                                       <p:cBhvr>
-                                        <p:cTn id="202" dur="1" fill="hold">
+                                        <p:cTn id="210" dur="1" fill="hold">
                                           <p:stCondLst>
                                             <p:cond delay="0"/>
                                           </p:stCondLst>
                                         </p:cTn>
                                         <p:tgtEl>
-                                          <p:spTgt spid="48"/>
+                                          <p:spTgt spid="168"/>
                                         </p:tgtEl>
                                         <p:attrNameLst>
                                           <p:attrName>style.visibility</p:attrName>
@@ -12036,9 +12192,9 @@
                                     </p:set>
                                     <p:anim calcmode="lin" valueType="num">
                                       <p:cBhvr>
-                                        <p:cTn id="203" dur="500" fill="hold"/>
-                                        <p:tgtEl>
-                                          <p:spTgt spid="48"/>
+                                        <p:cTn id="211" dur="500" fill="hold"/>
+                                        <p:tgtEl>
+                                          <p:spTgt spid="168"/>
                                         </p:tgtEl>
                                         <p:attrNameLst>
                                           <p:attrName>ppt_w</p:attrName>
@@ -12059,9 +12215,9 @@
                                     </p:anim>
                                     <p:anim calcmode="lin" valueType="num">
                                       <p:cBhvr>
-                                        <p:cTn id="204" dur="500" fill="hold"/>
-                                        <p:tgtEl>
-                                          <p:spTgt spid="48"/>
+                                        <p:cTn id="212" dur="500" fill="hold"/>
+                                        <p:tgtEl>
+                                          <p:spTgt spid="168"/>
                                         </p:tgtEl>
                                         <p:attrNameLst>
                                           <p:attrName>ppt_h</p:attrName>
@@ -12082,9 +12238,9 @@
                                     </p:anim>
                                     <p:animEffect transition="in" filter="fade">
                                       <p:cBhvr>
-                                        <p:cTn id="205" dur="500"/>
-                                        <p:tgtEl>
-                                          <p:spTgt spid="48"/>
+                                        <p:cTn id="213" dur="500"/>
+                                        <p:tgtEl>
+                                          <p:spTgt spid="168"/>
                                         </p:tgtEl>
                                       </p:cBhvr>
                                     </p:animEffect>
@@ -12092,20 +12248,20 @@
                                 </p:cTn>
                               </p:par>
                               <p:par>
-                                <p:cTn id="206" presetID="53" presetClass="entr" presetSubtype="16" fill="hold" grpId="0" nodeType="withEffect">
+                                <p:cTn id="214" presetID="53" presetClass="entr" presetSubtype="16" fill="hold" grpId="0" nodeType="withEffect">
                                   <p:stCondLst>
                                     <p:cond delay="0"/>
                                   </p:stCondLst>
                                   <p:childTnLst>
                                     <p:set>
                                       <p:cBhvr>
-                                        <p:cTn id="207" dur="1" fill="hold">
+                                        <p:cTn id="215" dur="1" fill="hold">
                                           <p:stCondLst>
                                             <p:cond delay="0"/>
                                           </p:stCondLst>
                                         </p:cTn>
                                         <p:tgtEl>
-                                          <p:spTgt spid="49"/>
+                                          <p:spTgt spid="167"/>
                                         </p:tgtEl>
                                         <p:attrNameLst>
                                           <p:attrName>style.visibility</p:attrName>
@@ -12117,9 +12273,9 @@
                                     </p:set>
                                     <p:anim calcmode="lin" valueType="num">
                                       <p:cBhvr>
-                                        <p:cTn id="208" dur="500" fill="hold"/>
-                                        <p:tgtEl>
-                                          <p:spTgt spid="49"/>
+                                        <p:cTn id="216" dur="500" fill="hold"/>
+                                        <p:tgtEl>
+                                          <p:spTgt spid="167"/>
                                         </p:tgtEl>
                                         <p:attrNameLst>
                                           <p:attrName>ppt_w</p:attrName>
@@ -12140,9 +12296,9 @@
                                     </p:anim>
                                     <p:anim calcmode="lin" valueType="num">
                                       <p:cBhvr>
-                                        <p:cTn id="209" dur="500" fill="hold"/>
-                                        <p:tgtEl>
-                                          <p:spTgt spid="49"/>
+                                        <p:cTn id="217" dur="500" fill="hold"/>
+                                        <p:tgtEl>
+                                          <p:spTgt spid="167"/>
                                         </p:tgtEl>
                                         <p:attrNameLst>
                                           <p:attrName>ppt_h</p:attrName>
@@ -12163,268 +12319,7 @@
                                     </p:anim>
                                     <p:animEffect transition="in" filter="fade">
                                       <p:cBhvr>
-                                        <p:cTn id="210" dur="500"/>
-                                        <p:tgtEl>
-                                          <p:spTgt spid="49"/>
-                                        </p:tgtEl>
-                                      </p:cBhvr>
-                                    </p:animEffect>
-                                  </p:childTnLst>
-                                </p:cTn>
-                              </p:par>
-                            </p:childTnLst>
-                          </p:cTn>
-                        </p:par>
-                      </p:childTnLst>
-                    </p:cTn>
-                  </p:par>
-                  <p:par>
-                    <p:cTn id="211" fill="hold">
-                      <p:stCondLst>
-                        <p:cond delay="indefinite"/>
-                      </p:stCondLst>
-                      <p:childTnLst>
-                        <p:par>
-                          <p:cTn id="212" fill="hold">
-                            <p:stCondLst>
-                              <p:cond delay="0"/>
-                            </p:stCondLst>
-                            <p:childTnLst>
-                              <p:par>
-                                <p:cTn id="213" presetID="53" presetClass="entr" presetSubtype="16" fill="hold" grpId="0" nodeType="clickEffect">
-                                  <p:stCondLst>
-                                    <p:cond delay="0"/>
-                                  </p:stCondLst>
-                                  <p:childTnLst>
-                                    <p:set>
-                                      <p:cBhvr>
-                                        <p:cTn id="214" dur="1" fill="hold">
-                                          <p:stCondLst>
-                                            <p:cond delay="0"/>
-                                          </p:stCondLst>
-                                        </p:cTn>
-                                        <p:tgtEl>
-                                          <p:spTgt spid="169"/>
-                                        </p:tgtEl>
-                                        <p:attrNameLst>
-                                          <p:attrName>style.visibility</p:attrName>
-                                        </p:attrNameLst>
-                                      </p:cBhvr>
-                                      <p:to>
-                                        <p:strVal val="visible"/>
-                                      </p:to>
-                                    </p:set>
-                                    <p:anim calcmode="lin" valueType="num">
-                                      <p:cBhvr>
-                                        <p:cTn id="215" dur="500" fill="hold"/>
-                                        <p:tgtEl>
-                                          <p:spTgt spid="169"/>
-                                        </p:tgtEl>
-                                        <p:attrNameLst>
-                                          <p:attrName>ppt_w</p:attrName>
-                                        </p:attrNameLst>
-                                      </p:cBhvr>
-                                      <p:tavLst>
-                                        <p:tav tm="0">
-                                          <p:val>
-                                            <p:fltVal val="0"/>
-                                          </p:val>
-                                        </p:tav>
-                                        <p:tav tm="100000">
-                                          <p:val>
-                                            <p:strVal val="#ppt_w"/>
-                                          </p:val>
-                                        </p:tav>
-                                      </p:tavLst>
-                                    </p:anim>
-                                    <p:anim calcmode="lin" valueType="num">
-                                      <p:cBhvr>
-                                        <p:cTn id="216" dur="500" fill="hold"/>
-                                        <p:tgtEl>
-                                          <p:spTgt spid="169"/>
-                                        </p:tgtEl>
-                                        <p:attrNameLst>
-                                          <p:attrName>ppt_h</p:attrName>
-                                        </p:attrNameLst>
-                                      </p:cBhvr>
-                                      <p:tavLst>
-                                        <p:tav tm="0">
-                                          <p:val>
-                                            <p:fltVal val="0"/>
-                                          </p:val>
-                                        </p:tav>
-                                        <p:tav tm="100000">
-                                          <p:val>
-                                            <p:strVal val="#ppt_h"/>
-                                          </p:val>
-                                        </p:tav>
-                                      </p:tavLst>
-                                    </p:anim>
-                                    <p:animEffect transition="in" filter="fade">
-                                      <p:cBhvr>
-                                        <p:cTn id="217" dur="500"/>
-                                        <p:tgtEl>
-                                          <p:spTgt spid="169"/>
-                                        </p:tgtEl>
-                                      </p:cBhvr>
-                                    </p:animEffect>
-                                  </p:childTnLst>
-                                </p:cTn>
-                              </p:par>
-                              <p:par>
-                                <p:cTn id="218" presetID="53" presetClass="entr" presetSubtype="16" fill="hold" grpId="0" nodeType="withEffect">
-                                  <p:stCondLst>
-                                    <p:cond delay="0"/>
-                                  </p:stCondLst>
-                                  <p:childTnLst>
-                                    <p:set>
-                                      <p:cBhvr>
-                                        <p:cTn id="219" dur="1" fill="hold">
-                                          <p:stCondLst>
-                                            <p:cond delay="0"/>
-                                          </p:stCondLst>
-                                        </p:cTn>
-                                        <p:tgtEl>
-                                          <p:spTgt spid="168"/>
-                                        </p:tgtEl>
-                                        <p:attrNameLst>
-                                          <p:attrName>style.visibility</p:attrName>
-                                        </p:attrNameLst>
-                                      </p:cBhvr>
-                                      <p:to>
-                                        <p:strVal val="visible"/>
-                                      </p:to>
-                                    </p:set>
-                                    <p:anim calcmode="lin" valueType="num">
-                                      <p:cBhvr>
-                                        <p:cTn id="220" dur="500" fill="hold"/>
-                                        <p:tgtEl>
-                                          <p:spTgt spid="168"/>
-                                        </p:tgtEl>
-                                        <p:attrNameLst>
-                                          <p:attrName>ppt_w</p:attrName>
-                                        </p:attrNameLst>
-                                      </p:cBhvr>
-                                      <p:tavLst>
-                                        <p:tav tm="0">
-                                          <p:val>
-                                            <p:fltVal val="0"/>
-                                          </p:val>
-                                        </p:tav>
-                                        <p:tav tm="100000">
-                                          <p:val>
-                                            <p:strVal val="#ppt_w"/>
-                                          </p:val>
-                                        </p:tav>
-                                      </p:tavLst>
-                                    </p:anim>
-                                    <p:anim calcmode="lin" valueType="num">
-                                      <p:cBhvr>
-                                        <p:cTn id="221" dur="500" fill="hold"/>
-                                        <p:tgtEl>
-                                          <p:spTgt spid="168"/>
-                                        </p:tgtEl>
-                                        <p:attrNameLst>
-                                          <p:attrName>ppt_h</p:attrName>
-                                        </p:attrNameLst>
-                                      </p:cBhvr>
-                                      <p:tavLst>
-                                        <p:tav tm="0">
-                                          <p:val>
-                                            <p:fltVal val="0"/>
-                                          </p:val>
-                                        </p:tav>
-                                        <p:tav tm="100000">
-                                          <p:val>
-                                            <p:strVal val="#ppt_h"/>
-                                          </p:val>
-                                        </p:tav>
-                                      </p:tavLst>
-                                    </p:anim>
-                                    <p:animEffect transition="in" filter="fade">
-                                      <p:cBhvr>
-                                        <p:cTn id="222" dur="500"/>
-                                        <p:tgtEl>
-                                          <p:spTgt spid="168"/>
-                                        </p:tgtEl>
-                                      </p:cBhvr>
-                                    </p:animEffect>
-                                  </p:childTnLst>
-                                </p:cTn>
-                              </p:par>
-                              <p:par>
-                                <p:cTn id="223" presetID="53" presetClass="entr" presetSubtype="16" fill="hold" grpId="0" nodeType="withEffect">
-                                  <p:stCondLst>
-                                    <p:cond delay="0"/>
-                                  </p:stCondLst>
-                                  <p:childTnLst>
-                                    <p:set>
-                                      <p:cBhvr>
-                                        <p:cTn id="224" dur="1" fill="hold">
-                                          <p:stCondLst>
-                                            <p:cond delay="0"/>
-                                          </p:stCondLst>
-                                        </p:cTn>
-                                        <p:tgtEl>
-                                          <p:spTgt spid="167"/>
-                                        </p:tgtEl>
-                                        <p:attrNameLst>
-                                          <p:attrName>style.visibility</p:attrName>
-                                        </p:attrNameLst>
-                                      </p:cBhvr>
-                                      <p:to>
-                                        <p:strVal val="visible"/>
-                                      </p:to>
-                                    </p:set>
-                                    <p:anim calcmode="lin" valueType="num">
-                                      <p:cBhvr>
-                                        <p:cTn id="225" dur="500" fill="hold"/>
-                                        <p:tgtEl>
-                                          <p:spTgt spid="167"/>
-                                        </p:tgtEl>
-                                        <p:attrNameLst>
-                                          <p:attrName>ppt_w</p:attrName>
-                                        </p:attrNameLst>
-                                      </p:cBhvr>
-                                      <p:tavLst>
-                                        <p:tav tm="0">
-                                          <p:val>
-                                            <p:fltVal val="0"/>
-                                          </p:val>
-                                        </p:tav>
-                                        <p:tav tm="100000">
-                                          <p:val>
-                                            <p:strVal val="#ppt_w"/>
-                                          </p:val>
-                                        </p:tav>
-                                      </p:tavLst>
-                                    </p:anim>
-                                    <p:anim calcmode="lin" valueType="num">
-                                      <p:cBhvr>
-                                        <p:cTn id="226" dur="500" fill="hold"/>
-                                        <p:tgtEl>
-                                          <p:spTgt spid="167"/>
-                                        </p:tgtEl>
-                                        <p:attrNameLst>
-                                          <p:attrName>ppt_h</p:attrName>
-                                        </p:attrNameLst>
-                                      </p:cBhvr>
-                                      <p:tavLst>
-                                        <p:tav tm="0">
-                                          <p:val>
-                                            <p:fltVal val="0"/>
-                                          </p:val>
-                                        </p:tav>
-                                        <p:tav tm="100000">
-                                          <p:val>
-                                            <p:strVal val="#ppt_h"/>
-                                          </p:val>
-                                        </p:tav>
-                                      </p:tavLst>
-                                    </p:anim>
-                                    <p:animEffect transition="in" filter="fade">
-                                      <p:cBhvr>
-                                        <p:cTn id="227" dur="500"/>
+                                        <p:cTn id="218" dur="500"/>
                                         <p:tgtEl>
                                           <p:spTgt spid="167"/>
                                         </p:tgtEl>
@@ -12462,7 +12357,6 @@
     </p:tnLst>
     <p:bldLst>
       <p:bldP spid="109" grpId="0" animBg="1"/>
-      <p:bldP spid="260" grpId="0"/>
       <p:bldP spid="7" grpId="0" animBg="1"/>
       <p:bldP spid="15" grpId="0" animBg="1"/>
       <p:bldP spid="16" grpId="0" animBg="1"/>
@@ -13041,7 +12935,7 @@
             <a:effectLst/>
             <a:extLst>
               <a:ext uri="{C572A759-6A51-4108-AA02-DFA0A04FC94B}">
-                <ma14:wrappingTextBoxFlag xmlns:ma14="http://schemas.microsoft.com/office/mac/drawingml/2011/main" xmlns:a14="http://schemas.microsoft.com/office/drawing/2010/main" xmlns:m="http://schemas.openxmlformats.org/officeDocument/2006/math" xmlns="" val="1"/>
+                <ma14:wrappingTextBoxFlag xmlns="" xmlns:m="http://schemas.openxmlformats.org/officeDocument/2006/math" xmlns:a14="http://schemas.microsoft.com/office/drawing/2010/main" xmlns:ma14="http://schemas.microsoft.com/office/mac/drawingml/2011/main" val="1"/>
               </a:ext>
             </a:extLst>
           </p:spPr>
@@ -13097,7 +12991,7 @@
             <a:effectLst/>
             <a:extLst>
               <a:ext uri="{C572A759-6A51-4108-AA02-DFA0A04FC94B}">
-                <ma14:wrappingTextBoxFlag xmlns:ma14="http://schemas.microsoft.com/office/mac/drawingml/2011/main" xmlns:a14="http://schemas.microsoft.com/office/drawing/2010/main" xmlns:m="http://schemas.openxmlformats.org/officeDocument/2006/math" xmlns="" val="1"/>
+                <ma14:wrappingTextBoxFlag xmlns="" xmlns:m="http://schemas.openxmlformats.org/officeDocument/2006/math" xmlns:a14="http://schemas.microsoft.com/office/drawing/2010/main" xmlns:ma14="http://schemas.microsoft.com/office/mac/drawingml/2011/main" val="1"/>
               </a:ext>
             </a:extLst>
           </p:spPr>

</xml_diff>